<commit_message>
more resources in deck
</commit_message>
<xml_diff>
--- a/Presentation/xplat-graph.pptx
+++ b/Presentation/xplat-graph.pptx
@@ -5,7 +5,7 @@
     <p:sldMasterId id="2147483648" r:id="rId1"/>
   </p:sldMasterIdLst>
   <p:notesMasterIdLst>
-    <p:notesMasterId r:id="rId23"/>
+    <p:notesMasterId r:id="rId25"/>
   </p:notesMasterIdLst>
   <p:sldIdLst>
     <p:sldId id="256" r:id="rId2"/>
@@ -25,10 +25,12 @@
     <p:sldId id="270" r:id="rId16"/>
     <p:sldId id="271" r:id="rId17"/>
     <p:sldId id="274" r:id="rId18"/>
-    <p:sldId id="275" r:id="rId19"/>
-    <p:sldId id="276" r:id="rId20"/>
-    <p:sldId id="273" r:id="rId21"/>
-    <p:sldId id="272" r:id="rId22"/>
+    <p:sldId id="277" r:id="rId19"/>
+    <p:sldId id="278" r:id="rId20"/>
+    <p:sldId id="275" r:id="rId21"/>
+    <p:sldId id="276" r:id="rId22"/>
+    <p:sldId id="273" r:id="rId23"/>
+    <p:sldId id="272" r:id="rId24"/>
   </p:sldIdLst>
   <p:sldSz cx="12192000" cy="6858000"/>
   <p:notesSz cx="6858000" cy="9144000"/>
@@ -177,6 +179,8 @@
         <p14:section name="Conclusion" id="{43AC6517-C251-4D1A-BB73-0C1F8E04C614}">
           <p14:sldIdLst>
             <p14:sldId id="274"/>
+            <p14:sldId id="277"/>
+            <p14:sldId id="278"/>
             <p14:sldId id="275"/>
             <p14:sldId id="276"/>
             <p14:sldId id="273"/>
@@ -5120,9 +5124,34 @@
         </p:nvSpPr>
         <p:spPr/>
         <p:txBody>
-          <a:bodyPr/>
-          <a:lstStyle/>
-          <a:p>
+          <a:bodyPr>
+            <a:normAutofit/>
+          </a:bodyPr>
+          <a:lstStyle/>
+          <a:p>
+            <a:r>
+              <a:rPr lang="en-AU" sz="2800" kern="1200" dirty="0">
+                <a:solidFill>
+                  <a:schemeClr val="tx1"/>
+                </a:solidFill>
+                <a:effectLst/>
+                <a:latin typeface="+mn-lt"/>
+                <a:ea typeface="+mn-ea"/>
+                <a:cs typeface="+mn-cs"/>
+              </a:rPr>
+              <a:t>Main MS Graph Landing Page</a:t>
+            </a:r>
+            <a:br>
+              <a:rPr lang="en-AU" sz="2800" kern="1200" dirty="0">
+                <a:solidFill>
+                  <a:schemeClr val="tx1"/>
+                </a:solidFill>
+                <a:effectLst/>
+                <a:latin typeface="+mn-lt"/>
+                <a:ea typeface="+mn-ea"/>
+                <a:cs typeface="+mn-cs"/>
+              </a:rPr>
+            </a:br>
             <a:r>
               <a:rPr lang="en-AU" dirty="0">
                 <a:hlinkClick r:id="rId2"/>
@@ -5133,6 +5162,29 @@
           </a:p>
           <a:p>
             <a:r>
+              <a:rPr lang="en-AU" sz="2800" kern="1200" dirty="0">
+                <a:solidFill>
+                  <a:schemeClr val="tx1"/>
+                </a:solidFill>
+                <a:effectLst/>
+                <a:latin typeface="+mn-lt"/>
+                <a:ea typeface="+mn-ea"/>
+                <a:cs typeface="+mn-cs"/>
+              </a:rPr>
+              <a:t>MS Graph Change Log</a:t>
+            </a:r>
+            <a:br>
+              <a:rPr lang="en-AU" sz="2800" kern="1200" dirty="0">
+                <a:solidFill>
+                  <a:schemeClr val="tx1"/>
+                </a:solidFill>
+                <a:effectLst/>
+                <a:latin typeface="+mn-lt"/>
+                <a:ea typeface="+mn-ea"/>
+                <a:cs typeface="+mn-cs"/>
+              </a:rPr>
+            </a:br>
+            <a:r>
               <a:rPr lang="en-AU" dirty="0">
                 <a:hlinkClick r:id="rId3"/>
               </a:rPr>
@@ -5145,44 +5197,63 @@
           </a:p>
           <a:p>
             <a:r>
+              <a:rPr lang="en-AU" sz="2800" kern="1200" dirty="0">
+                <a:solidFill>
+                  <a:schemeClr val="tx1"/>
+                </a:solidFill>
+                <a:effectLst/>
+                <a:latin typeface="+mn-lt"/>
+                <a:ea typeface="+mn-ea"/>
+                <a:cs typeface="+mn-cs"/>
+              </a:rPr>
+              <a:t>Excel REST API Documentation</a:t>
+            </a:r>
+            <a:br>
+              <a:rPr lang="en-AU" sz="2800" kern="1200" dirty="0">
+                <a:solidFill>
+                  <a:schemeClr val="tx1"/>
+                </a:solidFill>
+                <a:effectLst/>
+                <a:latin typeface="+mn-lt"/>
+                <a:ea typeface="+mn-ea"/>
+                <a:cs typeface="+mn-cs"/>
+              </a:rPr>
+            </a:br>
+            <a:r>
               <a:rPr lang="en-AU" dirty="0">
                 <a:hlinkClick r:id="rId4"/>
               </a:rPr>
-              <a:t>http://graph.microsoft.io/en-us/docs/api-reference/beta/resources/excel</a:t>
-            </a:r>
-            <a:r>
-              <a:rPr lang="en-AU" dirty="0"/>
+              <a:t>http://</a:t>
+            </a:r>
+            <a:r>
+              <a:rPr lang="en-AU">
+                <a:hlinkClick r:id="rId4"/>
+              </a:rPr>
+              <a:t>graph.microsoft.io/en-us/docs/api-reference/beta/resources/excel</a:t>
+            </a:r>
+            <a:r>
+              <a:rPr lang="en-AU"/>
               <a:t> </a:t>
             </a:r>
           </a:p>
           <a:p>
             <a:r>
-              <a:rPr lang="en-AU" dirty="0">
+              <a:rPr lang="en-AU"/>
+              <a:t>//build MSAL announcement</a:t>
+            </a:r>
+            <a:br>
+              <a:rPr lang="en-AU"/>
+            </a:br>
+            <a:r>
+              <a:rPr lang="en-AU">
                 <a:hlinkClick r:id="rId5"/>
               </a:rPr>
-              <a:t>https://channel9.msdn.com/Shows/Office-Dev-Show/Office-Dev-Show-Episode-28-Microsoft-Graph-and-Excel-APIs</a:t>
-            </a:r>
-            <a:endParaRPr lang="en-AU" dirty="0"/>
-          </a:p>
-          <a:p>
-            <a:r>
-              <a:rPr lang="en-AU" dirty="0">
-                <a:hlinkClick r:id="rId6"/>
-              </a:rPr>
-              <a:t>https://github.com/OfficeDev/Microsoft-Graph-ASPNET-REST-Excel-Donations</a:t>
-            </a:r>
-            <a:endParaRPr lang="en-AU" dirty="0"/>
-          </a:p>
-          <a:p>
-            <a:r>
-              <a:rPr lang="en-AU" dirty="0">
-                <a:hlinkClick r:id="rId7"/>
-              </a:rPr>
-              <a:t>https://github.com/microsoftgraph/xamarin-csharp-connect-sample</a:t>
-            </a:r>
-            <a:endParaRPr lang="en-AU" dirty="0"/>
-          </a:p>
-          <a:p>
+              <a:t>https://blogs.technet.microsoft.com/ad/2016/03/31/microsoft-identity-at-build-2016/</a:t>
+            </a:r>
+            <a:r>
+              <a:rPr lang="en-AU"/>
+              <a:t> </a:t>
+            </a:r>
             <a:endParaRPr lang="en-AU" dirty="0"/>
           </a:p>
         </p:txBody>
@@ -5234,7 +5305,15 @@
           <a:p>
             <a:r>
               <a:rPr lang="en-AU" dirty="0"/>
-              <a:t>Resources (//build/ videos)</a:t>
+              <a:t>Resources (</a:t>
+            </a:r>
+            <a:r>
+              <a:rPr lang="en-AU" dirty="0" err="1"/>
+              <a:t>cont</a:t>
+            </a:r>
+            <a:r>
+              <a:rPr lang="en-AU" dirty="0"/>
+              <a:t>)</a:t>
             </a:r>
           </a:p>
         </p:txBody>
@@ -5256,7 +5335,7 @@
           <a:p>
             <a:r>
               <a:rPr lang="en-AU" dirty="0"/>
-              <a:t>Microsoft Graph Overview</a:t>
+              <a:t>Office Developer Show on MSAL</a:t>
             </a:r>
             <a:br>
               <a:rPr lang="en-AU" dirty="0"/>
@@ -5265,67 +5344,51 @@
               <a:rPr lang="en-AU" dirty="0">
                 <a:hlinkClick r:id="rId2"/>
               </a:rPr>
-              <a:t>https://channel9.msdn.com/Events/Build/2016/P569</a:t>
-            </a:r>
-            <a:endParaRPr lang="en-AU" dirty="0"/>
-          </a:p>
-          <a:p>
+              <a:t>https://channel9.msdn.com/Shows/Office-Dev-Show/Office-Dev-Show-Episode-27-Azure-AD-Converged-Authentication-and-the-Microsoft-Graph</a:t>
+            </a:r>
             <a:r>
               <a:rPr lang="en-AU" dirty="0"/>
-              <a:t>Working with Excel Documents with the Microsoft Graph</a:t>
+              <a:t> </a:t>
+            </a:r>
+          </a:p>
+          <a:p>
+            <a:r>
+              <a:rPr lang="en-AU" sz="2800" kern="1200" dirty="0">
+                <a:solidFill>
+                  <a:schemeClr val="tx1"/>
+                </a:solidFill>
+                <a:effectLst/>
+                <a:latin typeface="+mn-lt"/>
+                <a:ea typeface="+mn-ea"/>
+                <a:cs typeface="+mn-cs"/>
+              </a:rPr>
+              <a:t>Office Developer Show on Excel REST API</a:t>
             </a:r>
             <a:br>
-              <a:rPr lang="en-AU" dirty="0"/>
+              <a:rPr lang="en-AU" sz="2800" kern="1200" dirty="0">
+                <a:solidFill>
+                  <a:schemeClr val="tx1"/>
+                </a:solidFill>
+                <a:effectLst/>
+                <a:latin typeface="+mn-lt"/>
+                <a:ea typeface="+mn-ea"/>
+                <a:cs typeface="+mn-cs"/>
+              </a:rPr>
             </a:br>
             <a:r>
               <a:rPr lang="en-AU" dirty="0">
                 <a:hlinkClick r:id="rId3"/>
               </a:rPr>
-              <a:t>https://channel9.msdn.com/Events/Build/2016/P556</a:t>
+              <a:t>https://channel9.msdn.com/Shows/Office-Dev-Show/Office-Dev-Show-Episode-28-Microsoft-Graph-and-Excel-APIs</a:t>
             </a:r>
             <a:endParaRPr lang="en-AU" dirty="0"/>
-          </a:p>
-          <a:p>
-            <a:r>
-              <a:rPr lang="en-AU" dirty="0"/>
-              <a:t>What's New with Microsoft Graph SDKs</a:t>
-            </a:r>
-            <a:br>
-              <a:rPr lang="en-AU" dirty="0"/>
-            </a:br>
-            <a:r>
-              <a:rPr lang="en-AU" dirty="0">
-                <a:hlinkClick r:id="rId4"/>
-              </a:rPr>
-              <a:t>https://channel9.msdn.com/Events/Build/2016/P563</a:t>
-            </a:r>
-            <a:endParaRPr lang="en-AU" dirty="0"/>
-          </a:p>
-          <a:p>
-            <a:r>
-              <a:rPr lang="en-AU" dirty="0"/>
-              <a:t>What's New in the People API on the Microsoft Graph</a:t>
-            </a:r>
-            <a:br>
-              <a:rPr lang="en-AU" dirty="0"/>
-            </a:br>
-            <a:r>
-              <a:rPr lang="en-AU" dirty="0">
-                <a:hlinkClick r:id="rId5"/>
-              </a:rPr>
-              <a:t>https://channel9.msdn.com/Events/Build/2016/P571</a:t>
-            </a:r>
-            <a:r>
-              <a:rPr lang="en-AU" dirty="0"/>
-              <a:t> </a:t>
-            </a:r>
           </a:p>
         </p:txBody>
       </p:sp>
     </p:spTree>
     <p:extLst>
       <p:ext uri="{BB962C8B-B14F-4D97-AF65-F5344CB8AC3E}">
-        <p14:creationId xmlns:p14="http://schemas.microsoft.com/office/powerpoint/2010/main" val="460096852"/>
+        <p14:creationId xmlns:p14="http://schemas.microsoft.com/office/powerpoint/2010/main" val="1079512826"/>
       </p:ext>
     </p:extLst>
   </p:cSld>
@@ -5369,7 +5432,7 @@
           <a:p>
             <a:r>
               <a:rPr lang="en-AU" dirty="0"/>
-              <a:t>Resources (Office Blog Posts)</a:t>
+              <a:t>Resources (Sample Code)</a:t>
             </a:r>
           </a:p>
         </p:txBody>
@@ -5390,16 +5453,12 @@
           <a:lstStyle/>
           <a:p>
             <a:r>
+              <a:rPr lang="en-AU" dirty="0" err="1"/>
+              <a:t>Xamarin</a:t>
+            </a:r>
+            <a:r>
               <a:rPr lang="en-AU" dirty="0"/>
-              <a:t>Microsoft Graph </a:t>
-            </a:r>
-            <a:r>
-              <a:rPr lang="en-AU" dirty="0" err="1"/>
-              <a:t>findMeetingTimes</a:t>
-            </a:r>
-            <a:r>
-              <a:rPr lang="en-AU" dirty="0"/>
-              <a:t> API update</a:t>
+              <a:t> Blog on MSAL and Forms</a:t>
             </a:r>
             <a:br>
               <a:rPr lang="en-AU" dirty="0"/>
@@ -5408,27 +5467,25 @@
               <a:rPr lang="en-AU" dirty="0">
                 <a:hlinkClick r:id="rId2"/>
               </a:rPr>
-              <a:t>http://dev.office.com/microsoft-graph-findmeetingtimes-api-update</a:t>
+              <a:t>https://blog.xamarin.com/authenticate-mobile-apps-using-microsoft-authentication-library/</a:t>
             </a:r>
             <a:endParaRPr lang="en-AU" dirty="0"/>
           </a:p>
           <a:p>
-            <a:r>
-              <a:rPr lang="en-AU" dirty="0"/>
-              <a:t>Office Dev PnP Web Cast – Introduction to Microsoft Graph for Office 365 developer</a:t>
-            </a:r>
-            <a:br>
-              <a:rPr lang="en-AU" dirty="0"/>
-            </a:br>
             <a:r>
               <a:rPr lang="en-AU" dirty="0">
                 <a:hlinkClick r:id="rId3"/>
               </a:rPr>
-              <a:t>http://dev.office.com/blogs/Introduction-to-Microsoft-Graph-for-Office-365-developer</a:t>
-            </a:r>
-            <a:endParaRPr lang="en-AU" dirty="0"/>
-          </a:p>
-          <a:p>
+              <a:t>https://github.com/OfficeDev/Microsoft-Graph-ASPNET-REST-Excel-Donations</a:t>
+            </a:r>
+          </a:p>
+          <a:p>
+            <a:r>
+              <a:rPr lang="en-AU" dirty="0">
+                <a:hlinkClick r:id="rId4"/>
+              </a:rPr>
+              <a:t>https://github.com/microsoftgraph/xamarin-csharp-connect-sample</a:t>
+            </a:r>
             <a:endParaRPr lang="en-AU" dirty="0"/>
           </a:p>
         </p:txBody>
@@ -5436,7 +5493,7 @@
     </p:spTree>
     <p:extLst>
       <p:ext uri="{BB962C8B-B14F-4D97-AF65-F5344CB8AC3E}">
-        <p14:creationId xmlns:p14="http://schemas.microsoft.com/office/powerpoint/2010/main" val="274775437"/>
+        <p14:creationId xmlns:p14="http://schemas.microsoft.com/office/powerpoint/2010/main" val="1992410197"/>
       </p:ext>
     </p:extLst>
   </p:cSld>
@@ -5620,6 +5677,249 @@
           <a:p>
             <a:r>
               <a:rPr lang="en-AU" dirty="0"/>
+              <a:t>Resources (//build/ videos)</a:t>
+            </a:r>
+          </a:p>
+        </p:txBody>
+      </p:sp>
+      <p:sp>
+        <p:nvSpPr>
+          <p:cNvPr id="3" name="Content Placeholder 2"/>
+          <p:cNvSpPr>
+            <a:spLocks noGrp="1"/>
+          </p:cNvSpPr>
+          <p:nvPr>
+            <p:ph idx="1"/>
+          </p:nvPr>
+        </p:nvSpPr>
+        <p:spPr/>
+        <p:txBody>
+          <a:bodyPr/>
+          <a:lstStyle/>
+          <a:p>
+            <a:r>
+              <a:rPr lang="en-AU" dirty="0"/>
+              <a:t>Microsoft Graph Overview</a:t>
+            </a:r>
+            <a:br>
+              <a:rPr lang="en-AU" dirty="0"/>
+            </a:br>
+            <a:r>
+              <a:rPr lang="en-AU" dirty="0">
+                <a:hlinkClick r:id="rId2"/>
+              </a:rPr>
+              <a:t>https://channel9.msdn.com/Events/Build/2016/P569</a:t>
+            </a:r>
+            <a:endParaRPr lang="en-AU" dirty="0"/>
+          </a:p>
+          <a:p>
+            <a:r>
+              <a:rPr lang="en-AU" dirty="0"/>
+              <a:t>Working with Excel Documents with the Microsoft Graph</a:t>
+            </a:r>
+            <a:br>
+              <a:rPr lang="en-AU" dirty="0"/>
+            </a:br>
+            <a:r>
+              <a:rPr lang="en-AU" dirty="0">
+                <a:hlinkClick r:id="rId3"/>
+              </a:rPr>
+              <a:t>https://channel9.msdn.com/Events/Build/2016/P556</a:t>
+            </a:r>
+            <a:endParaRPr lang="en-AU" dirty="0"/>
+          </a:p>
+          <a:p>
+            <a:r>
+              <a:rPr lang="en-AU" dirty="0"/>
+              <a:t>What's New with Microsoft Graph SDKs</a:t>
+            </a:r>
+            <a:br>
+              <a:rPr lang="en-AU" dirty="0"/>
+            </a:br>
+            <a:r>
+              <a:rPr lang="en-AU" dirty="0">
+                <a:hlinkClick r:id="rId4"/>
+              </a:rPr>
+              <a:t>https://channel9.msdn.com/Events/Build/2016/P563</a:t>
+            </a:r>
+            <a:endParaRPr lang="en-AU" dirty="0"/>
+          </a:p>
+          <a:p>
+            <a:r>
+              <a:rPr lang="en-AU" dirty="0"/>
+              <a:t>What's New in the People API on the Microsoft Graph</a:t>
+            </a:r>
+            <a:br>
+              <a:rPr lang="en-AU" dirty="0"/>
+            </a:br>
+            <a:r>
+              <a:rPr lang="en-AU" dirty="0">
+                <a:hlinkClick r:id="rId5"/>
+              </a:rPr>
+              <a:t>https://channel9.msdn.com/Events/Build/2016/P571</a:t>
+            </a:r>
+            <a:r>
+              <a:rPr lang="en-AU" dirty="0"/>
+              <a:t> </a:t>
+            </a:r>
+          </a:p>
+        </p:txBody>
+      </p:sp>
+    </p:spTree>
+    <p:extLst>
+      <p:ext uri="{BB962C8B-B14F-4D97-AF65-F5344CB8AC3E}">
+        <p14:creationId xmlns:p14="http://schemas.microsoft.com/office/powerpoint/2010/main" val="460096852"/>
+      </p:ext>
+    </p:extLst>
+  </p:cSld>
+  <p:clrMapOvr>
+    <a:masterClrMapping/>
+  </p:clrMapOvr>
+</p:sld>
+</file>
+
+<file path=ppt/slides/slide21.xml><?xml version="1.0" encoding="utf-8"?>
+<p:sld xmlns:a="http://schemas.openxmlformats.org/drawingml/2006/main" xmlns:r="http://schemas.openxmlformats.org/officeDocument/2006/relationships" xmlns:p="http://schemas.openxmlformats.org/presentationml/2006/main">
+  <p:cSld>
+    <p:spTree>
+      <p:nvGrpSpPr>
+        <p:cNvPr id="1" name=""/>
+        <p:cNvGrpSpPr/>
+        <p:nvPr/>
+      </p:nvGrpSpPr>
+      <p:grpSpPr>
+        <a:xfrm>
+          <a:off x="0" y="0"/>
+          <a:ext cx="0" cy="0"/>
+          <a:chOff x="0" y="0"/>
+          <a:chExt cx="0" cy="0"/>
+        </a:xfrm>
+      </p:grpSpPr>
+      <p:sp>
+        <p:nvSpPr>
+          <p:cNvPr id="2" name="Title 1"/>
+          <p:cNvSpPr>
+            <a:spLocks noGrp="1"/>
+          </p:cNvSpPr>
+          <p:nvPr>
+            <p:ph type="title"/>
+          </p:nvPr>
+        </p:nvSpPr>
+        <p:spPr/>
+        <p:txBody>
+          <a:bodyPr/>
+          <a:lstStyle/>
+          <a:p>
+            <a:r>
+              <a:rPr lang="en-AU" dirty="0"/>
+              <a:t>Resources (Office Blog Posts)</a:t>
+            </a:r>
+          </a:p>
+        </p:txBody>
+      </p:sp>
+      <p:sp>
+        <p:nvSpPr>
+          <p:cNvPr id="3" name="Content Placeholder 2"/>
+          <p:cNvSpPr>
+            <a:spLocks noGrp="1"/>
+          </p:cNvSpPr>
+          <p:nvPr>
+            <p:ph idx="1"/>
+          </p:nvPr>
+        </p:nvSpPr>
+        <p:spPr/>
+        <p:txBody>
+          <a:bodyPr/>
+          <a:lstStyle/>
+          <a:p>
+            <a:r>
+              <a:rPr lang="en-AU" dirty="0"/>
+              <a:t>Microsoft Graph </a:t>
+            </a:r>
+            <a:r>
+              <a:rPr lang="en-AU" dirty="0" err="1"/>
+              <a:t>findMeetingTimes</a:t>
+            </a:r>
+            <a:r>
+              <a:rPr lang="en-AU" dirty="0"/>
+              <a:t> API update</a:t>
+            </a:r>
+            <a:br>
+              <a:rPr lang="en-AU" dirty="0"/>
+            </a:br>
+            <a:r>
+              <a:rPr lang="en-AU" dirty="0">
+                <a:hlinkClick r:id="rId2"/>
+              </a:rPr>
+              <a:t>http://dev.office.com/microsoft-graph-findmeetingtimes-api-update</a:t>
+            </a:r>
+            <a:endParaRPr lang="en-AU" dirty="0"/>
+          </a:p>
+          <a:p>
+            <a:r>
+              <a:rPr lang="en-AU" dirty="0"/>
+              <a:t>Office Dev PnP Web Cast – Introduction to Microsoft Graph for Office 365 developer</a:t>
+            </a:r>
+            <a:br>
+              <a:rPr lang="en-AU" dirty="0"/>
+            </a:br>
+            <a:r>
+              <a:rPr lang="en-AU" dirty="0">
+                <a:hlinkClick r:id="rId3"/>
+              </a:rPr>
+              <a:t>http://dev.office.com/blogs/Introduction-to-Microsoft-Graph-for-Office-365-developer</a:t>
+            </a:r>
+            <a:endParaRPr lang="en-AU" dirty="0"/>
+          </a:p>
+        </p:txBody>
+      </p:sp>
+    </p:spTree>
+    <p:extLst>
+      <p:ext uri="{BB962C8B-B14F-4D97-AF65-F5344CB8AC3E}">
+        <p14:creationId xmlns:p14="http://schemas.microsoft.com/office/powerpoint/2010/main" val="274775437"/>
+      </p:ext>
+    </p:extLst>
+  </p:cSld>
+  <p:clrMapOvr>
+    <a:masterClrMapping/>
+  </p:clrMapOvr>
+</p:sld>
+</file>
+
+<file path=ppt/slides/slide22.xml><?xml version="1.0" encoding="utf-8"?>
+<p:sld xmlns:a="http://schemas.openxmlformats.org/drawingml/2006/main" xmlns:r="http://schemas.openxmlformats.org/officeDocument/2006/relationships" xmlns:p="http://schemas.openxmlformats.org/presentationml/2006/main">
+  <p:cSld>
+    <p:spTree>
+      <p:nvGrpSpPr>
+        <p:cNvPr id="1" name=""/>
+        <p:cNvGrpSpPr/>
+        <p:nvPr/>
+      </p:nvGrpSpPr>
+      <p:grpSpPr>
+        <a:xfrm>
+          <a:off x="0" y="0"/>
+          <a:ext cx="0" cy="0"/>
+          <a:chOff x="0" y="0"/>
+          <a:chExt cx="0" cy="0"/>
+        </a:xfrm>
+      </p:grpSpPr>
+      <p:sp>
+        <p:nvSpPr>
+          <p:cNvPr id="2" name="Title 1"/>
+          <p:cNvSpPr>
+            <a:spLocks noGrp="1"/>
+          </p:cNvSpPr>
+          <p:nvPr>
+            <p:ph type="title"/>
+          </p:nvPr>
+        </p:nvSpPr>
+        <p:spPr/>
+        <p:txBody>
+          <a:bodyPr/>
+          <a:lstStyle/>
+          <a:p>
+            <a:r>
+              <a:rPr lang="en-AU" dirty="0"/>
               <a:t>Agenda</a:t>
             </a:r>
           </a:p>
@@ -5726,7 +6026,7 @@
 </p:sld>
 </file>
 
-<file path=ppt/slides/slide21.xml><?xml version="1.0" encoding="utf-8"?>
+<file path=ppt/slides/slide23.xml><?xml version="1.0" encoding="utf-8"?>
 <p:sld xmlns:a="http://schemas.openxmlformats.org/drawingml/2006/main" xmlns:r="http://schemas.openxmlformats.org/officeDocument/2006/relationships" xmlns:p="http://schemas.openxmlformats.org/presentationml/2006/main">
   <p:cSld>
     <p:spTree>

</xml_diff>

<commit_message>
Gotchas in presentation, capabilities in Android, UWP and iOS
</commit_message>
<xml_diff>
--- a/Presentation/xplat-graph.pptx
+++ b/Presentation/xplat-graph.pptx
@@ -5,7 +5,7 @@
     <p:sldMasterId id="2147483648" r:id="rId1"/>
   </p:sldMasterIdLst>
   <p:notesMasterIdLst>
-    <p:notesMasterId r:id="rId25"/>
+    <p:notesMasterId r:id="rId28"/>
   </p:notesMasterIdLst>
   <p:sldIdLst>
     <p:sldId id="256" r:id="rId2"/>
@@ -22,15 +22,18 @@
     <p:sldId id="265" r:id="rId13"/>
     <p:sldId id="268" r:id="rId14"/>
     <p:sldId id="269" r:id="rId15"/>
-    <p:sldId id="270" r:id="rId16"/>
-    <p:sldId id="271" r:id="rId17"/>
-    <p:sldId id="274" r:id="rId18"/>
-    <p:sldId id="277" r:id="rId19"/>
-    <p:sldId id="278" r:id="rId20"/>
-    <p:sldId id="275" r:id="rId21"/>
-    <p:sldId id="276" r:id="rId22"/>
-    <p:sldId id="273" r:id="rId23"/>
-    <p:sldId id="272" r:id="rId24"/>
+    <p:sldId id="279" r:id="rId16"/>
+    <p:sldId id="280" r:id="rId17"/>
+    <p:sldId id="281" r:id="rId18"/>
+    <p:sldId id="270" r:id="rId19"/>
+    <p:sldId id="271" r:id="rId20"/>
+    <p:sldId id="274" r:id="rId21"/>
+    <p:sldId id="277" r:id="rId22"/>
+    <p:sldId id="278" r:id="rId23"/>
+    <p:sldId id="275" r:id="rId24"/>
+    <p:sldId id="276" r:id="rId25"/>
+    <p:sldId id="273" r:id="rId26"/>
+    <p:sldId id="272" r:id="rId27"/>
   </p:sldIdLst>
   <p:sldSz cx="12192000" cy="6858000"/>
   <p:notesSz cx="6858000" cy="9144000"/>
@@ -164,6 +167,9 @@
         <p14:section name="Auth with ADAL and MSAL" id="{DC1EA955-6CDB-404D-817C-D97C6D0316C4}">
           <p14:sldIdLst>
             <p14:sldId id="269"/>
+            <p14:sldId id="279"/>
+            <p14:sldId id="280"/>
+            <p14:sldId id="281"/>
           </p14:sldIdLst>
         </p14:section>
         <p14:section name="Building Common Code" id="{C9491002-3316-464E-988D-A5FB592B21AD}">
@@ -278,7 +284,7 @@
           <a:p>
             <a:fld id="{72DD6428-45E2-470D-A8B2-2ACADB0A0261}" type="datetimeFigureOut">
               <a:rPr lang="en-AU" smtClean="0"/>
-              <a:t>31/05/2016</a:t>
+              <a:t>6/06/2016</a:t>
             </a:fld>
             <a:endParaRPr lang="en-AU"/>
           </a:p>
@@ -1653,7 +1659,7 @@
           <a:p>
             <a:fld id="{46B904DE-CAB1-4272-A5F2-B54365C6E589}" type="datetimeFigureOut">
               <a:rPr lang="en-AU" smtClean="0"/>
-              <a:t>31/05/2016</a:t>
+              <a:t>6/06/2016</a:t>
             </a:fld>
             <a:endParaRPr lang="en-AU"/>
           </a:p>
@@ -1823,7 +1829,7 @@
           <a:p>
             <a:fld id="{46B904DE-CAB1-4272-A5F2-B54365C6E589}" type="datetimeFigureOut">
               <a:rPr lang="en-AU" smtClean="0"/>
-              <a:t>31/05/2016</a:t>
+              <a:t>6/06/2016</a:t>
             </a:fld>
             <a:endParaRPr lang="en-AU"/>
           </a:p>
@@ -2003,7 +2009,7 @@
           <a:p>
             <a:fld id="{46B904DE-CAB1-4272-A5F2-B54365C6E589}" type="datetimeFigureOut">
               <a:rPr lang="en-AU" smtClean="0"/>
-              <a:t>31/05/2016</a:t>
+              <a:t>6/06/2016</a:t>
             </a:fld>
             <a:endParaRPr lang="en-AU"/>
           </a:p>
@@ -2173,7 +2179,7 @@
           <a:p>
             <a:fld id="{46B904DE-CAB1-4272-A5F2-B54365C6E589}" type="datetimeFigureOut">
               <a:rPr lang="en-AU" smtClean="0"/>
-              <a:t>31/05/2016</a:t>
+              <a:t>6/06/2016</a:t>
             </a:fld>
             <a:endParaRPr lang="en-AU"/>
           </a:p>
@@ -2419,7 +2425,7 @@
           <a:p>
             <a:fld id="{46B904DE-CAB1-4272-A5F2-B54365C6E589}" type="datetimeFigureOut">
               <a:rPr lang="en-AU" smtClean="0"/>
-              <a:t>31/05/2016</a:t>
+              <a:t>6/06/2016</a:t>
             </a:fld>
             <a:endParaRPr lang="en-AU"/>
           </a:p>
@@ -2651,7 +2657,7 @@
           <a:p>
             <a:fld id="{46B904DE-CAB1-4272-A5F2-B54365C6E589}" type="datetimeFigureOut">
               <a:rPr lang="en-AU" smtClean="0"/>
-              <a:t>31/05/2016</a:t>
+              <a:t>6/06/2016</a:t>
             </a:fld>
             <a:endParaRPr lang="en-AU"/>
           </a:p>
@@ -3018,7 +3024,7 @@
           <a:p>
             <a:fld id="{46B904DE-CAB1-4272-A5F2-B54365C6E589}" type="datetimeFigureOut">
               <a:rPr lang="en-AU" smtClean="0"/>
-              <a:t>31/05/2016</a:t>
+              <a:t>6/06/2016</a:t>
             </a:fld>
             <a:endParaRPr lang="en-AU"/>
           </a:p>
@@ -3136,7 +3142,7 @@
           <a:p>
             <a:fld id="{46B904DE-CAB1-4272-A5F2-B54365C6E589}" type="datetimeFigureOut">
               <a:rPr lang="en-AU" smtClean="0"/>
-              <a:t>31/05/2016</a:t>
+              <a:t>6/06/2016</a:t>
             </a:fld>
             <a:endParaRPr lang="en-AU"/>
           </a:p>
@@ -3231,7 +3237,7 @@
           <a:p>
             <a:fld id="{46B904DE-CAB1-4272-A5F2-B54365C6E589}" type="datetimeFigureOut">
               <a:rPr lang="en-AU" smtClean="0"/>
-              <a:t>31/05/2016</a:t>
+              <a:t>6/06/2016</a:t>
             </a:fld>
             <a:endParaRPr lang="en-AU"/>
           </a:p>
@@ -3508,7 +3514,7 @@
           <a:p>
             <a:fld id="{46B904DE-CAB1-4272-A5F2-B54365C6E589}" type="datetimeFigureOut">
               <a:rPr lang="en-AU" smtClean="0"/>
-              <a:t>31/05/2016</a:t>
+              <a:t>6/06/2016</a:t>
             </a:fld>
             <a:endParaRPr lang="en-AU"/>
           </a:p>
@@ -3761,7 +3767,7 @@
           <a:p>
             <a:fld id="{46B904DE-CAB1-4272-A5F2-B54365C6E589}" type="datetimeFigureOut">
               <a:rPr lang="en-AU" smtClean="0"/>
-              <a:t>31/05/2016</a:t>
+              <a:t>6/06/2016</a:t>
             </a:fld>
             <a:endParaRPr lang="en-AU"/>
           </a:p>
@@ -3974,7 +3980,7 @@
           <a:p>
             <a:fld id="{46B904DE-CAB1-4272-A5F2-B54365C6E589}" type="datetimeFigureOut">
               <a:rPr lang="en-AU" smtClean="0"/>
-              <a:t>31/05/2016</a:t>
+              <a:t>6/06/2016</a:t>
             </a:fld>
             <a:endParaRPr lang="en-AU"/>
           </a:p>
@@ -4847,18 +4853,6 @@
           <a:p>
             <a:pPr rtl="0" eaLnBrk="1" latinLnBrk="0" hangingPunct="1"/>
             <a:r>
-              <a:rPr lang="en-AU" sz="6000" kern="1200" dirty="0" err="1">
-                <a:solidFill>
-                  <a:schemeClr val="tx1"/>
-                </a:solidFill>
-                <a:effectLst/>
-                <a:latin typeface="+mj-lt"/>
-                <a:ea typeface="+mj-ea"/>
-                <a:cs typeface="+mj-cs"/>
-              </a:rPr>
-              <a:t>Auth</a:t>
-            </a:r>
-            <a:r>
               <a:rPr lang="en-AU" sz="6000" kern="1200" dirty="0">
                 <a:solidFill>
                   <a:schemeClr val="tx1"/>
@@ -4868,7 +4862,7 @@
                 <a:ea typeface="+mj-ea"/>
                 <a:cs typeface="+mj-cs"/>
               </a:rPr>
-              <a:t> with ADAL and MSAL</a:t>
+              <a:t>Cross-Platform Auth with MSAL</a:t>
             </a:r>
             <a:endParaRPr lang="en-AU" dirty="0"/>
           </a:p>
@@ -4925,7 +4919,7 @@
       </p:grpSpPr>
       <p:sp>
         <p:nvSpPr>
-          <p:cNvPr id="2" name="Title 1"/>
+          <p:cNvPr id="4" name="Title 3"/>
           <p:cNvSpPr>
             <a:spLocks noGrp="1"/>
           </p:cNvSpPr>
@@ -4938,18 +4932,9 @@
           <a:bodyPr/>
           <a:lstStyle/>
           <a:p>
-            <a:pPr rtl="0" eaLnBrk="1" latinLnBrk="0" hangingPunct="1"/>
-            <a:r>
-              <a:rPr lang="en-AU" sz="6000" kern="1200" dirty="0">
-                <a:solidFill>
-                  <a:schemeClr val="tx1"/>
-                </a:solidFill>
-                <a:effectLst/>
-                <a:latin typeface="+mj-lt"/>
-                <a:ea typeface="+mj-ea"/>
-                <a:cs typeface="+mj-cs"/>
-              </a:rPr>
-              <a:t>Building Common Code</a:t>
+            <a:r>
+              <a:rPr lang="en-AU" dirty="0" err="1"/>
+              <a:t>Gotchas</a:t>
             </a:r>
             <a:endParaRPr lang="en-AU" dirty="0"/>
           </a:p>
@@ -4957,27 +4942,129 @@
       </p:sp>
       <p:sp>
         <p:nvSpPr>
-          <p:cNvPr id="3" name="Text Placeholder 2"/>
-          <p:cNvSpPr>
-            <a:spLocks noGrp="1"/>
-          </p:cNvSpPr>
-          <p:nvPr>
-            <p:ph type="body" idx="1"/>
-          </p:nvPr>
-        </p:nvSpPr>
-        <p:spPr/>
-        <p:txBody>
-          <a:bodyPr/>
-          <a:lstStyle/>
-          <a:p>
-            <a:endParaRPr lang="en-AU"/>
-          </a:p>
-        </p:txBody>
-      </p:sp>
+          <p:cNvPr id="5" name="Content Placeholder 4"/>
+          <p:cNvSpPr>
+            <a:spLocks noGrp="1"/>
+          </p:cNvSpPr>
+          <p:nvPr>
+            <p:ph sz="half" idx="1"/>
+          </p:nvPr>
+        </p:nvSpPr>
+        <p:spPr/>
+        <p:txBody>
+          <a:bodyPr/>
+          <a:lstStyle/>
+          <a:p>
+            <a:r>
+              <a:rPr lang="en-AU" dirty="0"/>
+              <a:t>You need PCL Profile 7 (no WP8)</a:t>
+            </a:r>
+          </a:p>
+          <a:p>
+            <a:pPr lvl="1"/>
+            <a:r>
+              <a:rPr lang="en-AU" dirty="0"/>
+              <a:t>Default is 111</a:t>
+            </a:r>
+          </a:p>
+          <a:p>
+            <a:pPr lvl="1"/>
+            <a:r>
+              <a:rPr lang="en-AU" dirty="0"/>
+              <a:t>Edit the Project file</a:t>
+            </a:r>
+          </a:p>
+        </p:txBody>
+      </p:sp>
+      <p:grpSp>
+        <p:nvGrpSpPr>
+          <p:cNvPr id="7" name="Group 6"/>
+          <p:cNvGrpSpPr/>
+          <p:nvPr/>
+        </p:nvGrpSpPr>
+        <p:grpSpPr>
+          <a:xfrm>
+            <a:off x="4892744" y="2405890"/>
+            <a:ext cx="7515225" cy="4829175"/>
+            <a:chOff x="4892744" y="2405890"/>
+            <a:chExt cx="7515225" cy="4829175"/>
+          </a:xfrm>
+        </p:grpSpPr>
+        <p:pic>
+          <p:nvPicPr>
+            <p:cNvPr id="2" name="Picture 1"/>
+            <p:cNvPicPr>
+              <a:picLocks noChangeAspect="1"/>
+            </p:cNvPicPr>
+            <p:nvPr/>
+          </p:nvPicPr>
+          <p:blipFill>
+            <a:blip r:embed="rId2"/>
+            <a:stretch>
+              <a:fillRect/>
+            </a:stretch>
+          </p:blipFill>
+          <p:spPr>
+            <a:xfrm>
+              <a:off x="4892744" y="2405890"/>
+              <a:ext cx="7515225" cy="4829175"/>
+            </a:xfrm>
+            <a:prstGeom prst="rect">
+              <a:avLst/>
+            </a:prstGeom>
+          </p:spPr>
+        </p:pic>
+        <p:sp>
+          <p:nvSpPr>
+            <p:cNvPr id="3" name="Rounded Rectangle 2"/>
+            <p:cNvSpPr/>
+            <p:nvPr/>
+          </p:nvSpPr>
+          <p:spPr>
+            <a:xfrm>
+              <a:off x="6019800" y="5446643"/>
+              <a:ext cx="5917096" cy="327992"/>
+            </a:xfrm>
+            <a:prstGeom prst="roundRect">
+              <a:avLst/>
+            </a:prstGeom>
+            <a:noFill/>
+            <a:ln w="38100">
+              <a:solidFill>
+                <a:srgbClr val="FF0000"/>
+              </a:solidFill>
+            </a:ln>
+          </p:spPr>
+          <p:style>
+            <a:lnRef idx="2">
+              <a:schemeClr val="accent1">
+                <a:shade val="50000"/>
+              </a:schemeClr>
+            </a:lnRef>
+            <a:fillRef idx="1">
+              <a:schemeClr val="accent1"/>
+            </a:fillRef>
+            <a:effectRef idx="0">
+              <a:schemeClr val="accent1"/>
+            </a:effectRef>
+            <a:fontRef idx="minor">
+              <a:schemeClr val="lt1"/>
+            </a:fontRef>
+          </p:style>
+          <p:txBody>
+            <a:bodyPr rtlCol="0" anchor="ctr"/>
+            <a:lstStyle/>
+            <a:p>
+              <a:pPr algn="ctr"/>
+              <a:endParaRPr lang="en-AU"/>
+            </a:p>
+          </p:txBody>
+        </p:sp>
+      </p:grpSp>
     </p:spTree>
     <p:extLst>
       <p:ext uri="{BB962C8B-B14F-4D97-AF65-F5344CB8AC3E}">
-        <p14:creationId xmlns:p14="http://schemas.microsoft.com/office/powerpoint/2010/main" val="1431032375"/>
+        <p14:creationId xmlns:p14="http://schemas.microsoft.com/office/powerpoint/2010/main" val="1332242941"/>
       </p:ext>
     </p:extLst>
   </p:cSld>
@@ -5019,43 +5106,105 @@
           <a:bodyPr/>
           <a:lstStyle/>
           <a:p>
-            <a:pPr rtl="0" eaLnBrk="1" latinLnBrk="0" hangingPunct="1"/>
-            <a:r>
-              <a:rPr lang="en-AU" sz="6000" kern="1200" dirty="0">
-                <a:solidFill>
-                  <a:schemeClr val="tx1"/>
-                </a:solidFill>
-                <a:effectLst/>
-                <a:latin typeface="+mj-lt"/>
-                <a:ea typeface="+mj-ea"/>
-                <a:cs typeface="+mj-cs"/>
-              </a:rPr>
-              <a:t>Bringing It All Together</a:t>
-            </a:r>
-            <a:endParaRPr lang="en-AU" dirty="0">
-              <a:effectLst/>
-            </a:endParaRPr>
-          </a:p>
-          <a:p>
-            <a:endParaRPr lang="en-AU" dirty="0"/>
-          </a:p>
-        </p:txBody>
-      </p:sp>
-      <p:sp>
-        <p:nvSpPr>
-          <p:cNvPr id="3" name="Text Placeholder 2"/>
-          <p:cNvSpPr>
-            <a:spLocks noGrp="1"/>
-          </p:cNvSpPr>
-          <p:nvPr>
-            <p:ph type="body" idx="1"/>
-          </p:nvPr>
-        </p:nvSpPr>
-        <p:spPr/>
-        <p:txBody>
-          <a:bodyPr/>
-          <a:lstStyle/>
-          <a:p>
+            <a:r>
+              <a:rPr lang="en-AU" dirty="0" err="1"/>
+              <a:t>Gotchas</a:t>
+            </a:r>
+            <a:r>
+              <a:rPr lang="en-AU" dirty="0"/>
+              <a:t> (Android)</a:t>
+            </a:r>
+          </a:p>
+        </p:txBody>
+      </p:sp>
+      <p:sp>
+        <p:nvSpPr>
+          <p:cNvPr id="3" name="Content Placeholder 2"/>
+          <p:cNvSpPr>
+            <a:spLocks noGrp="1"/>
+          </p:cNvSpPr>
+          <p:nvPr>
+            <p:ph sz="half" idx="1"/>
+          </p:nvPr>
+        </p:nvSpPr>
+        <p:spPr/>
+        <p:txBody>
+          <a:bodyPr/>
+          <a:lstStyle/>
+          <a:p>
+            <a:r>
+              <a:rPr lang="en-AU" dirty="0"/>
+              <a:t>Turn off Fast Deployment</a:t>
+            </a:r>
+          </a:p>
+        </p:txBody>
+      </p:sp>
+      <p:pic>
+        <p:nvPicPr>
+          <p:cNvPr id="5" name="Picture 4"/>
+          <p:cNvPicPr>
+            <a:picLocks noChangeAspect="1"/>
+          </p:cNvPicPr>
+          <p:nvPr/>
+        </p:nvPicPr>
+        <p:blipFill>
+          <a:blip r:embed="rId2"/>
+          <a:stretch>
+            <a:fillRect/>
+          </a:stretch>
+        </p:blipFill>
+        <p:spPr>
+          <a:xfrm>
+            <a:off x="4738255" y="2519779"/>
+            <a:ext cx="7453745" cy="4338221"/>
+          </a:xfrm>
+          <a:prstGeom prst="rect">
+            <a:avLst/>
+          </a:prstGeom>
+        </p:spPr>
+      </p:pic>
+      <p:sp>
+        <p:nvSpPr>
+          <p:cNvPr id="6" name="Rounded Rectangle 5"/>
+          <p:cNvSpPr/>
+          <p:nvPr/>
+        </p:nvSpPr>
+        <p:spPr>
+          <a:xfrm>
+            <a:off x="6917635" y="4890052"/>
+            <a:ext cx="3101008" cy="288235"/>
+          </a:xfrm>
+          <a:prstGeom prst="roundRect">
+            <a:avLst/>
+          </a:prstGeom>
+          <a:noFill/>
+          <a:ln w="57150">
+            <a:solidFill>
+              <a:srgbClr val="FF0000"/>
+            </a:solidFill>
+          </a:ln>
+        </p:spPr>
+        <p:style>
+          <a:lnRef idx="2">
+            <a:schemeClr val="accent1">
+              <a:shade val="50000"/>
+            </a:schemeClr>
+          </a:lnRef>
+          <a:fillRef idx="1">
+            <a:schemeClr val="accent1"/>
+          </a:fillRef>
+          <a:effectRef idx="0">
+            <a:schemeClr val="accent1"/>
+          </a:effectRef>
+          <a:fontRef idx="minor">
+            <a:schemeClr val="lt1"/>
+          </a:fontRef>
+        </p:style>
+        <p:txBody>
+          <a:bodyPr rtlCol="0" anchor="ctr"/>
+          <a:lstStyle/>
+          <a:p>
+            <a:pPr algn="ctr"/>
             <a:endParaRPr lang="en-AU"/>
           </a:p>
         </p:txBody>
@@ -5063,7 +5212,7 @@
     </p:spTree>
     <p:extLst>
       <p:ext uri="{BB962C8B-B14F-4D97-AF65-F5344CB8AC3E}">
-        <p14:creationId xmlns:p14="http://schemas.microsoft.com/office/powerpoint/2010/main" val="3824826661"/>
+        <p14:creationId xmlns:p14="http://schemas.microsoft.com/office/powerpoint/2010/main" val="3221372989"/>
       </p:ext>
     </p:extLst>
   </p:cSld>
@@ -5092,7 +5241,7 @@
       </p:grpSpPr>
       <p:sp>
         <p:nvSpPr>
-          <p:cNvPr id="5" name="Title 4"/>
+          <p:cNvPr id="2" name="Title 1"/>
           <p:cNvSpPr>
             <a:spLocks noGrp="1"/>
           </p:cNvSpPr>
@@ -5106,168 +5255,454 @@
           <a:lstStyle/>
           <a:p>
             <a:r>
+              <a:rPr lang="en-AU" dirty="0" err="1"/>
+              <a:t>Gotchas</a:t>
+            </a:r>
+            <a:r>
               <a:rPr lang="en-AU" dirty="0"/>
-              <a:t>Resources</a:t>
-            </a:r>
-          </a:p>
-        </p:txBody>
-      </p:sp>
-      <p:sp>
-        <p:nvSpPr>
-          <p:cNvPr id="6" name="Content Placeholder 5"/>
-          <p:cNvSpPr>
-            <a:spLocks noGrp="1"/>
-          </p:cNvSpPr>
-          <p:nvPr>
-            <p:ph idx="1"/>
-          </p:nvPr>
-        </p:nvSpPr>
-        <p:spPr/>
-        <p:txBody>
-          <a:bodyPr>
-            <a:normAutofit/>
-          </a:bodyPr>
-          <a:lstStyle/>
-          <a:p>
-            <a:r>
-              <a:rPr lang="en-AU" sz="2800" kern="1200" dirty="0">
-                <a:solidFill>
-                  <a:schemeClr val="tx1"/>
-                </a:solidFill>
-                <a:effectLst/>
-                <a:latin typeface="+mn-lt"/>
-                <a:ea typeface="+mn-ea"/>
-                <a:cs typeface="+mn-cs"/>
-              </a:rPr>
-              <a:t>Main MS Graph Landing Page</a:t>
-            </a:r>
-            <a:br>
-              <a:rPr lang="en-AU" sz="2800" kern="1200" dirty="0">
-                <a:solidFill>
-                  <a:schemeClr val="tx1"/>
-                </a:solidFill>
-                <a:effectLst/>
-                <a:latin typeface="+mn-lt"/>
-                <a:ea typeface="+mn-ea"/>
-                <a:cs typeface="+mn-cs"/>
-              </a:rPr>
-            </a:br>
-            <a:r>
-              <a:rPr lang="en-AU" dirty="0">
-                <a:hlinkClick r:id="rId2"/>
-              </a:rPr>
-              <a:t>https://graph.Microsoft.io</a:t>
-            </a:r>
-            <a:endParaRPr lang="en-AU" dirty="0"/>
-          </a:p>
-          <a:p>
-            <a:r>
-              <a:rPr lang="en-AU" sz="2800" kern="1200" dirty="0">
-                <a:solidFill>
-                  <a:schemeClr val="tx1"/>
-                </a:solidFill>
-                <a:effectLst/>
-                <a:latin typeface="+mn-lt"/>
-                <a:ea typeface="+mn-ea"/>
-                <a:cs typeface="+mn-cs"/>
-              </a:rPr>
-              <a:t>MS Graph Change Log</a:t>
-            </a:r>
-            <a:br>
-              <a:rPr lang="en-AU" sz="2800" kern="1200" dirty="0">
-                <a:solidFill>
-                  <a:schemeClr val="tx1"/>
-                </a:solidFill>
-                <a:effectLst/>
-                <a:latin typeface="+mn-lt"/>
-                <a:ea typeface="+mn-ea"/>
-                <a:cs typeface="+mn-cs"/>
-              </a:rPr>
-            </a:br>
-            <a:r>
-              <a:rPr lang="en-AU" dirty="0">
-                <a:hlinkClick r:id="rId3"/>
-              </a:rPr>
-              <a:t>https://graph.microsoft.io/changelog</a:t>
+              <a:t> (Android </a:t>
+            </a:r>
+            <a:r>
+              <a:rPr lang="en-AU" dirty="0" err="1"/>
+              <a:t>cont</a:t>
             </a:r>
             <a:r>
               <a:rPr lang="en-AU" dirty="0"/>
-              <a:t> </a:t>
-            </a:r>
-          </a:p>
-          <a:p>
-            <a:r>
-              <a:rPr lang="en-AU" sz="2800" kern="1200" dirty="0">
-                <a:solidFill>
-                  <a:schemeClr val="tx1"/>
-                </a:solidFill>
-                <a:effectLst/>
-                <a:latin typeface="+mn-lt"/>
-                <a:ea typeface="+mn-ea"/>
-                <a:cs typeface="+mn-cs"/>
-              </a:rPr>
-              <a:t>Excel REST API Documentation</a:t>
-            </a:r>
-            <a:br>
-              <a:rPr lang="en-AU" sz="2800" kern="1200" dirty="0">
-                <a:solidFill>
-                  <a:schemeClr val="tx1"/>
-                </a:solidFill>
-                <a:effectLst/>
-                <a:latin typeface="+mn-lt"/>
-                <a:ea typeface="+mn-ea"/>
-                <a:cs typeface="+mn-cs"/>
-              </a:rPr>
-            </a:br>
-            <a:r>
-              <a:rPr lang="en-AU" dirty="0">
-                <a:hlinkClick r:id="rId4"/>
-              </a:rPr>
-              <a:t>http://</a:t>
-            </a:r>
-            <a:r>
-              <a:rPr lang="en-AU">
-                <a:hlinkClick r:id="rId4"/>
-              </a:rPr>
-              <a:t>graph.microsoft.io/en-us/docs/api-reference/beta/resources/excel</a:t>
-            </a:r>
-            <a:r>
-              <a:rPr lang="en-AU"/>
-              <a:t> </a:t>
-            </a:r>
-          </a:p>
-          <a:p>
-            <a:r>
-              <a:rPr lang="en-AU"/>
-              <a:t>//build MSAL announcement</a:t>
-            </a:r>
-            <a:br>
-              <a:rPr lang="en-AU"/>
-            </a:br>
-            <a:r>
-              <a:rPr lang="en-AU">
-                <a:hlinkClick r:id="rId5"/>
-              </a:rPr>
-              <a:t>https://blogs.technet.microsoft.com/ad/2016/03/31/microsoft-identity-at-build-2016/</a:t>
-            </a:r>
-            <a:r>
-              <a:rPr lang="en-AU"/>
-              <a:t> </a:t>
-            </a:r>
-            <a:endParaRPr lang="en-AU" dirty="0"/>
-          </a:p>
-        </p:txBody>
-      </p:sp>
+              <a:t>)</a:t>
+            </a:r>
+          </a:p>
+        </p:txBody>
+      </p:sp>
+      <p:sp>
+        <p:nvSpPr>
+          <p:cNvPr id="3" name="Content Placeholder 2"/>
+          <p:cNvSpPr>
+            <a:spLocks noGrp="1"/>
+          </p:cNvSpPr>
+          <p:nvPr>
+            <p:ph sz="half" idx="1"/>
+          </p:nvPr>
+        </p:nvSpPr>
+        <p:spPr/>
+        <p:txBody>
+          <a:bodyPr/>
+          <a:lstStyle/>
+          <a:p>
+            <a:r>
+              <a:rPr lang="en-AU" dirty="0"/>
+              <a:t>Enable x-machine CPU support in Hyper-V</a:t>
+            </a:r>
+          </a:p>
+        </p:txBody>
+      </p:sp>
+      <p:grpSp>
+        <p:nvGrpSpPr>
+          <p:cNvPr id="7" name="Group 6"/>
+          <p:cNvGrpSpPr/>
+          <p:nvPr/>
+        </p:nvGrpSpPr>
+        <p:grpSpPr>
+          <a:xfrm>
+            <a:off x="838200" y="0"/>
+            <a:ext cx="9110870" cy="6867525"/>
+            <a:chOff x="838200" y="0"/>
+            <a:chExt cx="9110870" cy="6867525"/>
+          </a:xfrm>
+        </p:grpSpPr>
+        <p:pic>
+          <p:nvPicPr>
+            <p:cNvPr id="5" name="Picture 4"/>
+            <p:cNvPicPr>
+              <a:picLocks noChangeAspect="1"/>
+            </p:cNvPicPr>
+            <p:nvPr/>
+          </p:nvPicPr>
+          <p:blipFill>
+            <a:blip r:embed="rId2"/>
+            <a:stretch>
+              <a:fillRect/>
+            </a:stretch>
+          </p:blipFill>
+          <p:spPr>
+            <a:xfrm>
+              <a:off x="838200" y="0"/>
+              <a:ext cx="9010650" cy="6867525"/>
+            </a:xfrm>
+            <a:prstGeom prst="rect">
+              <a:avLst/>
+            </a:prstGeom>
+          </p:spPr>
+        </p:pic>
+        <p:sp>
+          <p:nvSpPr>
+            <p:cNvPr id="6" name="Rounded Rectangle 5"/>
+            <p:cNvSpPr/>
+            <p:nvPr/>
+          </p:nvSpPr>
+          <p:spPr>
+            <a:xfrm>
+              <a:off x="6351104" y="4522304"/>
+              <a:ext cx="3597966" cy="318053"/>
+            </a:xfrm>
+            <a:prstGeom prst="roundRect">
+              <a:avLst/>
+            </a:prstGeom>
+            <a:noFill/>
+            <a:ln w="38100">
+              <a:solidFill>
+                <a:srgbClr val="FF0000"/>
+              </a:solidFill>
+            </a:ln>
+          </p:spPr>
+          <p:style>
+            <a:lnRef idx="2">
+              <a:schemeClr val="accent1">
+                <a:shade val="50000"/>
+              </a:schemeClr>
+            </a:lnRef>
+            <a:fillRef idx="1">
+              <a:schemeClr val="accent1"/>
+            </a:fillRef>
+            <a:effectRef idx="0">
+              <a:schemeClr val="accent1"/>
+            </a:effectRef>
+            <a:fontRef idx="minor">
+              <a:schemeClr val="lt1"/>
+            </a:fontRef>
+          </p:style>
+          <p:txBody>
+            <a:bodyPr rtlCol="0" anchor="ctr"/>
+            <a:lstStyle/>
+            <a:p>
+              <a:pPr algn="ctr"/>
+              <a:endParaRPr lang="en-AU"/>
+            </a:p>
+          </p:txBody>
+        </p:sp>
+      </p:grpSp>
+      <p:grpSp>
+        <p:nvGrpSpPr>
+          <p:cNvPr id="10" name="Group 9"/>
+          <p:cNvGrpSpPr/>
+          <p:nvPr/>
+        </p:nvGrpSpPr>
+        <p:grpSpPr>
+          <a:xfrm>
+            <a:off x="2657475" y="157162"/>
+            <a:ext cx="6877050" cy="6543675"/>
+            <a:chOff x="2657475" y="157162"/>
+            <a:chExt cx="6877050" cy="6543675"/>
+          </a:xfrm>
+        </p:grpSpPr>
+        <p:pic>
+          <p:nvPicPr>
+            <p:cNvPr id="8" name="Picture 7"/>
+            <p:cNvPicPr>
+              <a:picLocks noChangeAspect="1"/>
+            </p:cNvPicPr>
+            <p:nvPr/>
+          </p:nvPicPr>
+          <p:blipFill>
+            <a:blip r:embed="rId3"/>
+            <a:stretch>
+              <a:fillRect/>
+            </a:stretch>
+          </p:blipFill>
+          <p:spPr>
+            <a:xfrm>
+              <a:off x="2657475" y="157162"/>
+              <a:ext cx="6877050" cy="6543675"/>
+            </a:xfrm>
+            <a:prstGeom prst="rect">
+              <a:avLst/>
+            </a:prstGeom>
+          </p:spPr>
+        </p:pic>
+        <p:sp>
+          <p:nvSpPr>
+            <p:cNvPr id="9" name="Rounded Rectangle 8"/>
+            <p:cNvSpPr/>
+            <p:nvPr/>
+          </p:nvSpPr>
+          <p:spPr>
+            <a:xfrm>
+              <a:off x="5185317" y="1550890"/>
+              <a:ext cx="3724507" cy="323386"/>
+            </a:xfrm>
+            <a:prstGeom prst="roundRect">
+              <a:avLst/>
+            </a:prstGeom>
+            <a:noFill/>
+            <a:ln w="57150">
+              <a:solidFill>
+                <a:srgbClr val="FF0000"/>
+              </a:solidFill>
+            </a:ln>
+          </p:spPr>
+          <p:style>
+            <a:lnRef idx="2">
+              <a:schemeClr val="accent1">
+                <a:shade val="50000"/>
+              </a:schemeClr>
+            </a:lnRef>
+            <a:fillRef idx="1">
+              <a:schemeClr val="accent1"/>
+            </a:fillRef>
+            <a:effectRef idx="0">
+              <a:schemeClr val="accent1"/>
+            </a:effectRef>
+            <a:fontRef idx="minor">
+              <a:schemeClr val="lt1"/>
+            </a:fontRef>
+          </p:style>
+          <p:txBody>
+            <a:bodyPr rtlCol="0" anchor="ctr"/>
+            <a:lstStyle/>
+            <a:p>
+              <a:pPr algn="ctr"/>
+              <a:endParaRPr lang="en-AU"/>
+            </a:p>
+          </p:txBody>
+        </p:sp>
+      </p:grpSp>
     </p:spTree>
     <p:extLst>
       <p:ext uri="{BB962C8B-B14F-4D97-AF65-F5344CB8AC3E}">
-        <p14:creationId xmlns:p14="http://schemas.microsoft.com/office/powerpoint/2010/main" val="2338366687"/>
+        <p14:creationId xmlns:p14="http://schemas.microsoft.com/office/powerpoint/2010/main" val="2255499522"/>
       </p:ext>
     </p:extLst>
   </p:cSld>
   <p:clrMapOvr>
     <a:masterClrMapping/>
   </p:clrMapOvr>
+  <p:timing>
+    <p:tnLst>
+      <p:par>
+        <p:cTn id="1" dur="indefinite" restart="never" nodeType="tmRoot">
+          <p:childTnLst>
+            <p:seq concurrent="1" nextAc="seek">
+              <p:cTn id="2" dur="indefinite" nodeType="mainSeq">
+                <p:childTnLst>
+                  <p:par>
+                    <p:cTn id="3" fill="hold">
+                      <p:stCondLst>
+                        <p:cond delay="indefinite"/>
+                      </p:stCondLst>
+                      <p:childTnLst>
+                        <p:par>
+                          <p:cTn id="4" fill="hold">
+                            <p:stCondLst>
+                              <p:cond delay="0"/>
+                            </p:stCondLst>
+                            <p:childTnLst>
+                              <p:par>
+                                <p:cTn id="5" presetID="53" presetClass="entr" presetSubtype="16" fill="hold" nodeType="clickEffect">
+                                  <p:stCondLst>
+                                    <p:cond delay="0"/>
+                                  </p:stCondLst>
+                                  <p:childTnLst>
+                                    <p:set>
+                                      <p:cBhvr>
+                                        <p:cTn id="6" dur="1" fill="hold">
+                                          <p:stCondLst>
+                                            <p:cond delay="0"/>
+                                          </p:stCondLst>
+                                        </p:cTn>
+                                        <p:tgtEl>
+                                          <p:spTgt spid="7"/>
+                                        </p:tgtEl>
+                                        <p:attrNameLst>
+                                          <p:attrName>style.visibility</p:attrName>
+                                        </p:attrNameLst>
+                                      </p:cBhvr>
+                                      <p:to>
+                                        <p:strVal val="visible"/>
+                                      </p:to>
+                                    </p:set>
+                                    <p:anim calcmode="lin" valueType="num">
+                                      <p:cBhvr>
+                                        <p:cTn id="7" dur="500" fill="hold"/>
+                                        <p:tgtEl>
+                                          <p:spTgt spid="7"/>
+                                        </p:tgtEl>
+                                        <p:attrNameLst>
+                                          <p:attrName>ppt_w</p:attrName>
+                                        </p:attrNameLst>
+                                      </p:cBhvr>
+                                      <p:tavLst>
+                                        <p:tav tm="0">
+                                          <p:val>
+                                            <p:fltVal val="0"/>
+                                          </p:val>
+                                        </p:tav>
+                                        <p:tav tm="100000">
+                                          <p:val>
+                                            <p:strVal val="#ppt_w"/>
+                                          </p:val>
+                                        </p:tav>
+                                      </p:tavLst>
+                                    </p:anim>
+                                    <p:anim calcmode="lin" valueType="num">
+                                      <p:cBhvr>
+                                        <p:cTn id="8" dur="500" fill="hold"/>
+                                        <p:tgtEl>
+                                          <p:spTgt spid="7"/>
+                                        </p:tgtEl>
+                                        <p:attrNameLst>
+                                          <p:attrName>ppt_h</p:attrName>
+                                        </p:attrNameLst>
+                                      </p:cBhvr>
+                                      <p:tavLst>
+                                        <p:tav tm="0">
+                                          <p:val>
+                                            <p:fltVal val="0"/>
+                                          </p:val>
+                                        </p:tav>
+                                        <p:tav tm="100000">
+                                          <p:val>
+                                            <p:strVal val="#ppt_h"/>
+                                          </p:val>
+                                        </p:tav>
+                                      </p:tavLst>
+                                    </p:anim>
+                                    <p:animEffect transition="in" filter="fade">
+                                      <p:cBhvr>
+                                        <p:cTn id="9" dur="500"/>
+                                        <p:tgtEl>
+                                          <p:spTgt spid="7"/>
+                                        </p:tgtEl>
+                                      </p:cBhvr>
+                                    </p:animEffect>
+                                  </p:childTnLst>
+                                </p:cTn>
+                              </p:par>
+                            </p:childTnLst>
+                          </p:cTn>
+                        </p:par>
+                      </p:childTnLst>
+                    </p:cTn>
+                  </p:par>
+                  <p:par>
+                    <p:cTn id="10" fill="hold">
+                      <p:stCondLst>
+                        <p:cond delay="indefinite"/>
+                      </p:stCondLst>
+                      <p:childTnLst>
+                        <p:par>
+                          <p:cTn id="11" fill="hold">
+                            <p:stCondLst>
+                              <p:cond delay="0"/>
+                            </p:stCondLst>
+                            <p:childTnLst>
+                              <p:par>
+                                <p:cTn id="12" presetID="53" presetClass="entr" presetSubtype="16" fill="hold" nodeType="clickEffect">
+                                  <p:stCondLst>
+                                    <p:cond delay="0"/>
+                                  </p:stCondLst>
+                                  <p:childTnLst>
+                                    <p:set>
+                                      <p:cBhvr>
+                                        <p:cTn id="13" dur="1" fill="hold">
+                                          <p:stCondLst>
+                                            <p:cond delay="0"/>
+                                          </p:stCondLst>
+                                        </p:cTn>
+                                        <p:tgtEl>
+                                          <p:spTgt spid="10"/>
+                                        </p:tgtEl>
+                                        <p:attrNameLst>
+                                          <p:attrName>style.visibility</p:attrName>
+                                        </p:attrNameLst>
+                                      </p:cBhvr>
+                                      <p:to>
+                                        <p:strVal val="visible"/>
+                                      </p:to>
+                                    </p:set>
+                                    <p:anim calcmode="lin" valueType="num">
+                                      <p:cBhvr>
+                                        <p:cTn id="14" dur="500" fill="hold"/>
+                                        <p:tgtEl>
+                                          <p:spTgt spid="10"/>
+                                        </p:tgtEl>
+                                        <p:attrNameLst>
+                                          <p:attrName>ppt_w</p:attrName>
+                                        </p:attrNameLst>
+                                      </p:cBhvr>
+                                      <p:tavLst>
+                                        <p:tav tm="0">
+                                          <p:val>
+                                            <p:fltVal val="0"/>
+                                          </p:val>
+                                        </p:tav>
+                                        <p:tav tm="100000">
+                                          <p:val>
+                                            <p:strVal val="#ppt_w"/>
+                                          </p:val>
+                                        </p:tav>
+                                      </p:tavLst>
+                                    </p:anim>
+                                    <p:anim calcmode="lin" valueType="num">
+                                      <p:cBhvr>
+                                        <p:cTn id="15" dur="500" fill="hold"/>
+                                        <p:tgtEl>
+                                          <p:spTgt spid="10"/>
+                                        </p:tgtEl>
+                                        <p:attrNameLst>
+                                          <p:attrName>ppt_h</p:attrName>
+                                        </p:attrNameLst>
+                                      </p:cBhvr>
+                                      <p:tavLst>
+                                        <p:tav tm="0">
+                                          <p:val>
+                                            <p:fltVal val="0"/>
+                                          </p:val>
+                                        </p:tav>
+                                        <p:tav tm="100000">
+                                          <p:val>
+                                            <p:strVal val="#ppt_h"/>
+                                          </p:val>
+                                        </p:tav>
+                                      </p:tavLst>
+                                    </p:anim>
+                                    <p:animEffect transition="in" filter="fade">
+                                      <p:cBhvr>
+                                        <p:cTn id="16" dur="500"/>
+                                        <p:tgtEl>
+                                          <p:spTgt spid="10"/>
+                                        </p:tgtEl>
+                                      </p:cBhvr>
+                                    </p:animEffect>
+                                  </p:childTnLst>
+                                </p:cTn>
+                              </p:par>
+                            </p:childTnLst>
+                          </p:cTn>
+                        </p:par>
+                      </p:childTnLst>
+                    </p:cTn>
+                  </p:par>
+                </p:childTnLst>
+              </p:cTn>
+              <p:prevCondLst>
+                <p:cond evt="onPrev" delay="0">
+                  <p:tgtEl>
+                    <p:sldTgt/>
+                  </p:tgtEl>
+                </p:cond>
+              </p:prevCondLst>
+              <p:nextCondLst>
+                <p:cond evt="onNext" delay="0">
+                  <p:tgtEl>
+                    <p:sldTgt/>
+                  </p:tgtEl>
+                </p:cond>
+              </p:nextCondLst>
+            </p:seq>
+          </p:childTnLst>
+        </p:cTn>
+      </p:par>
+    </p:tnLst>
+  </p:timing>
 </p:sld>
 </file>
 
@@ -5303,92 +5738,46 @@
           <a:bodyPr/>
           <a:lstStyle/>
           <a:p>
-            <a:r>
-              <a:rPr lang="en-AU" dirty="0"/>
-              <a:t>Resources (</a:t>
-            </a:r>
-            <a:r>
-              <a:rPr lang="en-AU" dirty="0" err="1"/>
-              <a:t>cont</a:t>
-            </a:r>
-            <a:r>
-              <a:rPr lang="en-AU" dirty="0"/>
-              <a:t>)</a:t>
-            </a:r>
-          </a:p>
-        </p:txBody>
-      </p:sp>
-      <p:sp>
-        <p:nvSpPr>
-          <p:cNvPr id="3" name="Content Placeholder 2"/>
-          <p:cNvSpPr>
-            <a:spLocks noGrp="1"/>
-          </p:cNvSpPr>
-          <p:nvPr>
-            <p:ph idx="1"/>
-          </p:nvPr>
-        </p:nvSpPr>
-        <p:spPr/>
-        <p:txBody>
-          <a:bodyPr/>
-          <a:lstStyle/>
-          <a:p>
-            <a:r>
-              <a:rPr lang="en-AU" dirty="0"/>
-              <a:t>Office Developer Show on MSAL</a:t>
-            </a:r>
-            <a:br>
-              <a:rPr lang="en-AU" dirty="0"/>
-            </a:br>
-            <a:r>
-              <a:rPr lang="en-AU" dirty="0">
-                <a:hlinkClick r:id="rId2"/>
-              </a:rPr>
-              <a:t>https://channel9.msdn.com/Shows/Office-Dev-Show/Office-Dev-Show-Episode-27-Azure-AD-Converged-Authentication-and-the-Microsoft-Graph</a:t>
-            </a:r>
-            <a:r>
-              <a:rPr lang="en-AU" dirty="0"/>
-              <a:t> </a:t>
-            </a:r>
-          </a:p>
-          <a:p>
-            <a:r>
-              <a:rPr lang="en-AU" sz="2800" kern="1200" dirty="0">
+            <a:pPr rtl="0" eaLnBrk="1" latinLnBrk="0" hangingPunct="1"/>
+            <a:r>
+              <a:rPr lang="en-AU" sz="6000" kern="1200" dirty="0">
                 <a:solidFill>
                   <a:schemeClr val="tx1"/>
                 </a:solidFill>
                 <a:effectLst/>
-                <a:latin typeface="+mn-lt"/>
-                <a:ea typeface="+mn-ea"/>
-                <a:cs typeface="+mn-cs"/>
+                <a:latin typeface="+mj-lt"/>
+                <a:ea typeface="+mj-ea"/>
+                <a:cs typeface="+mj-cs"/>
               </a:rPr>
-              <a:t>Office Developer Show on Excel REST API</a:t>
-            </a:r>
-            <a:br>
-              <a:rPr lang="en-AU" sz="2800" kern="1200" dirty="0">
-                <a:solidFill>
-                  <a:schemeClr val="tx1"/>
-                </a:solidFill>
-                <a:effectLst/>
-                <a:latin typeface="+mn-lt"/>
-                <a:ea typeface="+mn-ea"/>
-                <a:cs typeface="+mn-cs"/>
-              </a:rPr>
-            </a:br>
-            <a:r>
-              <a:rPr lang="en-AU" dirty="0">
-                <a:hlinkClick r:id="rId3"/>
-              </a:rPr>
-              <a:t>https://channel9.msdn.com/Shows/Office-Dev-Show/Office-Dev-Show-Episode-28-Microsoft-Graph-and-Excel-APIs</a:t>
+              <a:t>Building Common Code</a:t>
             </a:r>
             <a:endParaRPr lang="en-AU" dirty="0"/>
+          </a:p>
+        </p:txBody>
+      </p:sp>
+      <p:sp>
+        <p:nvSpPr>
+          <p:cNvPr id="3" name="Text Placeholder 2"/>
+          <p:cNvSpPr>
+            <a:spLocks noGrp="1"/>
+          </p:cNvSpPr>
+          <p:nvPr>
+            <p:ph type="body" idx="1"/>
+          </p:nvPr>
+        </p:nvSpPr>
+        <p:spPr/>
+        <p:txBody>
+          <a:bodyPr/>
+          <a:lstStyle/>
+          <a:p>
+            <a:endParaRPr lang="en-AU"/>
           </a:p>
         </p:txBody>
       </p:sp>
     </p:spTree>
     <p:extLst>
       <p:ext uri="{BB962C8B-B14F-4D97-AF65-F5344CB8AC3E}">
-        <p14:creationId xmlns:p14="http://schemas.microsoft.com/office/powerpoint/2010/main" val="1079512826"/>
+        <p14:creationId xmlns:p14="http://schemas.microsoft.com/office/powerpoint/2010/main" val="1431032375"/>
       </p:ext>
     </p:extLst>
   </p:cSld>
@@ -5430,70 +5819,51 @@
           <a:bodyPr/>
           <a:lstStyle/>
           <a:p>
-            <a:r>
-              <a:rPr lang="en-AU" dirty="0"/>
-              <a:t>Resources (Sample Code)</a:t>
-            </a:r>
-          </a:p>
-        </p:txBody>
-      </p:sp>
-      <p:sp>
-        <p:nvSpPr>
-          <p:cNvPr id="3" name="Content Placeholder 2"/>
-          <p:cNvSpPr>
-            <a:spLocks noGrp="1"/>
-          </p:cNvSpPr>
-          <p:nvPr>
-            <p:ph idx="1"/>
-          </p:nvPr>
-        </p:nvSpPr>
-        <p:spPr/>
-        <p:txBody>
-          <a:bodyPr/>
-          <a:lstStyle/>
-          <a:p>
-            <a:r>
-              <a:rPr lang="en-AU" dirty="0" err="1"/>
-              <a:t>Xamarin</a:t>
-            </a:r>
-            <a:r>
-              <a:rPr lang="en-AU" dirty="0"/>
-              <a:t> Blog on MSAL and Forms</a:t>
-            </a:r>
-            <a:br>
-              <a:rPr lang="en-AU" dirty="0"/>
-            </a:br>
-            <a:r>
-              <a:rPr lang="en-AU" dirty="0">
-                <a:hlinkClick r:id="rId2"/>
+            <a:pPr rtl="0" eaLnBrk="1" latinLnBrk="0" hangingPunct="1"/>
+            <a:r>
+              <a:rPr lang="en-AU" sz="6000" kern="1200" dirty="0">
+                <a:solidFill>
+                  <a:schemeClr val="tx1"/>
+                </a:solidFill>
+                <a:effectLst/>
+                <a:latin typeface="+mj-lt"/>
+                <a:ea typeface="+mj-ea"/>
+                <a:cs typeface="+mj-cs"/>
               </a:rPr>
-              <a:t>https://blog.xamarin.com/authenticate-mobile-apps-using-microsoft-authentication-library/</a:t>
-            </a:r>
+              <a:t>Bringing It All Together</a:t>
+            </a:r>
+            <a:endParaRPr lang="en-AU" dirty="0">
+              <a:effectLst/>
+            </a:endParaRPr>
+          </a:p>
+          <a:p>
             <a:endParaRPr lang="en-AU" dirty="0"/>
           </a:p>
-          <a:p>
-            <a:r>
-              <a:rPr lang="en-AU" dirty="0">
-                <a:hlinkClick r:id="rId3"/>
-              </a:rPr>
-              <a:t>https://github.com/OfficeDev/Microsoft-Graph-ASPNET-REST-Excel-Donations</a:t>
-            </a:r>
-          </a:p>
-          <a:p>
-            <a:r>
-              <a:rPr lang="en-AU" dirty="0">
-                <a:hlinkClick r:id="rId4"/>
-              </a:rPr>
-              <a:t>https://github.com/microsoftgraph/xamarin-csharp-connect-sample</a:t>
-            </a:r>
-            <a:endParaRPr lang="en-AU" dirty="0"/>
+        </p:txBody>
+      </p:sp>
+      <p:sp>
+        <p:nvSpPr>
+          <p:cNvPr id="3" name="Text Placeholder 2"/>
+          <p:cNvSpPr>
+            <a:spLocks noGrp="1"/>
+          </p:cNvSpPr>
+          <p:nvPr>
+            <p:ph type="body" idx="1"/>
+          </p:nvPr>
+        </p:nvSpPr>
+        <p:spPr/>
+        <p:txBody>
+          <a:bodyPr/>
+          <a:lstStyle/>
+          <a:p>
+            <a:endParaRPr lang="en-AU"/>
           </a:p>
         </p:txBody>
       </p:sp>
     </p:spTree>
     <p:extLst>
       <p:ext uri="{BB962C8B-B14F-4D97-AF65-F5344CB8AC3E}">
-        <p14:creationId xmlns:p14="http://schemas.microsoft.com/office/powerpoint/2010/main" val="1992410197"/>
+        <p14:creationId xmlns:p14="http://schemas.microsoft.com/office/powerpoint/2010/main" val="3824826661"/>
       </p:ext>
     </p:extLst>
   </p:cSld>
@@ -5662,7 +6032,7 @@
       </p:grpSpPr>
       <p:sp>
         <p:nvSpPr>
-          <p:cNvPr id="2" name="Title 1"/>
+          <p:cNvPr id="5" name="Title 4"/>
           <p:cNvSpPr>
             <a:spLocks noGrp="1"/>
           </p:cNvSpPr>
@@ -5677,14 +6047,14 @@
           <a:p>
             <a:r>
               <a:rPr lang="en-AU" dirty="0"/>
-              <a:t>Resources (//build/ videos)</a:t>
-            </a:r>
-          </a:p>
-        </p:txBody>
-      </p:sp>
-      <p:sp>
-        <p:nvSpPr>
-          <p:cNvPr id="3" name="Content Placeholder 2"/>
+              <a:t>Resources</a:t>
+            </a:r>
+          </a:p>
+        </p:txBody>
+      </p:sp>
+      <p:sp>
+        <p:nvSpPr>
+          <p:cNvPr id="6" name="Content Placeholder 5"/>
           <p:cNvSpPr>
             <a:spLocks noGrp="1"/>
           </p:cNvSpPr>
@@ -5694,81 +6064,144 @@
         </p:nvSpPr>
         <p:spPr/>
         <p:txBody>
-          <a:bodyPr/>
-          <a:lstStyle/>
-          <a:p>
-            <a:r>
-              <a:rPr lang="en-AU" dirty="0"/>
-              <a:t>Microsoft Graph Overview</a:t>
+          <a:bodyPr>
+            <a:normAutofit/>
+          </a:bodyPr>
+          <a:lstStyle/>
+          <a:p>
+            <a:r>
+              <a:rPr lang="en-AU" sz="2800" kern="1200" dirty="0">
+                <a:solidFill>
+                  <a:schemeClr val="tx1"/>
+                </a:solidFill>
+                <a:effectLst/>
+                <a:latin typeface="+mn-lt"/>
+                <a:ea typeface="+mn-ea"/>
+                <a:cs typeface="+mn-cs"/>
+              </a:rPr>
+              <a:t>Main MS Graph Landing Page</a:t>
             </a:r>
             <a:br>
-              <a:rPr lang="en-AU" dirty="0"/>
+              <a:rPr lang="en-AU" sz="2800" kern="1200" dirty="0">
+                <a:solidFill>
+                  <a:schemeClr val="tx1"/>
+                </a:solidFill>
+                <a:effectLst/>
+                <a:latin typeface="+mn-lt"/>
+                <a:ea typeface="+mn-ea"/>
+                <a:cs typeface="+mn-cs"/>
+              </a:rPr>
             </a:br>
             <a:r>
               <a:rPr lang="en-AU" dirty="0">
                 <a:hlinkClick r:id="rId2"/>
               </a:rPr>
-              <a:t>https://channel9.msdn.com/Events/Build/2016/P569</a:t>
+              <a:t>https://graph.Microsoft.io</a:t>
             </a:r>
             <a:endParaRPr lang="en-AU" dirty="0"/>
           </a:p>
           <a:p>
             <a:r>
-              <a:rPr lang="en-AU" dirty="0"/>
-              <a:t>Working with Excel Documents with the Microsoft Graph</a:t>
+              <a:rPr lang="en-AU" sz="2800" kern="1200" dirty="0">
+                <a:solidFill>
+                  <a:schemeClr val="tx1"/>
+                </a:solidFill>
+                <a:effectLst/>
+                <a:latin typeface="+mn-lt"/>
+                <a:ea typeface="+mn-ea"/>
+                <a:cs typeface="+mn-cs"/>
+              </a:rPr>
+              <a:t>MS Graph Change Log</a:t>
             </a:r>
             <a:br>
-              <a:rPr lang="en-AU" dirty="0"/>
+              <a:rPr lang="en-AU" sz="2800" kern="1200" dirty="0">
+                <a:solidFill>
+                  <a:schemeClr val="tx1"/>
+                </a:solidFill>
+                <a:effectLst/>
+                <a:latin typeface="+mn-lt"/>
+                <a:ea typeface="+mn-ea"/>
+                <a:cs typeface="+mn-cs"/>
+              </a:rPr>
             </a:br>
             <a:r>
               <a:rPr lang="en-AU" dirty="0">
                 <a:hlinkClick r:id="rId3"/>
               </a:rPr>
-              <a:t>https://channel9.msdn.com/Events/Build/2016/P556</a:t>
-            </a:r>
-            <a:endParaRPr lang="en-AU" dirty="0"/>
-          </a:p>
-          <a:p>
+              <a:t>https://graph.microsoft.io/changelog</a:t>
+            </a:r>
             <a:r>
               <a:rPr lang="en-AU" dirty="0"/>
-              <a:t>What's New with Microsoft Graph SDKs</a:t>
+              <a:t> </a:t>
+            </a:r>
+          </a:p>
+          <a:p>
+            <a:r>
+              <a:rPr lang="en-AU" sz="2800" kern="1200" dirty="0">
+                <a:solidFill>
+                  <a:schemeClr val="tx1"/>
+                </a:solidFill>
+                <a:effectLst/>
+                <a:latin typeface="+mn-lt"/>
+                <a:ea typeface="+mn-ea"/>
+                <a:cs typeface="+mn-cs"/>
+              </a:rPr>
+              <a:t>Excel REST API Documentation</a:t>
             </a:r>
             <a:br>
-              <a:rPr lang="en-AU" dirty="0"/>
+              <a:rPr lang="en-AU" sz="2800" kern="1200" dirty="0">
+                <a:solidFill>
+                  <a:schemeClr val="tx1"/>
+                </a:solidFill>
+                <a:effectLst/>
+                <a:latin typeface="+mn-lt"/>
+                <a:ea typeface="+mn-ea"/>
+                <a:cs typeface="+mn-cs"/>
+              </a:rPr>
             </a:br>
             <a:r>
               <a:rPr lang="en-AU" dirty="0">
                 <a:hlinkClick r:id="rId4"/>
               </a:rPr>
-              <a:t>https://channel9.msdn.com/Events/Build/2016/P563</a:t>
-            </a:r>
-            <a:endParaRPr lang="en-AU" dirty="0"/>
-          </a:p>
-          <a:p>
-            <a:r>
-              <a:rPr lang="en-AU" dirty="0"/>
-              <a:t>What's New in the People API on the Microsoft Graph</a:t>
+              <a:t>http://</a:t>
+            </a:r>
+            <a:r>
+              <a:rPr lang="en-AU">
+                <a:hlinkClick r:id="rId4"/>
+              </a:rPr>
+              <a:t>graph.microsoft.io/en-us/docs/api-reference/beta/resources/excel</a:t>
+            </a:r>
+            <a:r>
+              <a:rPr lang="en-AU"/>
+              <a:t> </a:t>
+            </a:r>
+          </a:p>
+          <a:p>
+            <a:r>
+              <a:rPr lang="en-AU"/>
+              <a:t>//build MSAL announcement</a:t>
             </a:r>
             <a:br>
-              <a:rPr lang="en-AU" dirty="0"/>
+              <a:rPr lang="en-AU"/>
             </a:br>
             <a:r>
-              <a:rPr lang="en-AU" dirty="0">
+              <a:rPr lang="en-AU">
                 <a:hlinkClick r:id="rId5"/>
               </a:rPr>
-              <a:t>https://channel9.msdn.com/Events/Build/2016/P571</a:t>
-            </a:r>
-            <a:r>
-              <a:rPr lang="en-AU" dirty="0"/>
+              <a:t>https://blogs.technet.microsoft.com/ad/2016/03/31/microsoft-identity-at-build-2016/</a:t>
+            </a:r>
+            <a:r>
+              <a:rPr lang="en-AU"/>
               <a:t> </a:t>
             </a:r>
+            <a:endParaRPr lang="en-AU" dirty="0"/>
           </a:p>
         </p:txBody>
       </p:sp>
     </p:spTree>
     <p:extLst>
       <p:ext uri="{BB962C8B-B14F-4D97-AF65-F5344CB8AC3E}">
-        <p14:creationId xmlns:p14="http://schemas.microsoft.com/office/powerpoint/2010/main" val="460096852"/>
+        <p14:creationId xmlns:p14="http://schemas.microsoft.com/office/powerpoint/2010/main" val="2338366687"/>
       </p:ext>
     </p:extLst>
   </p:cSld>
@@ -5812,6 +6245,373 @@
           <a:p>
             <a:r>
               <a:rPr lang="en-AU" dirty="0"/>
+              <a:t>Resources (</a:t>
+            </a:r>
+            <a:r>
+              <a:rPr lang="en-AU" dirty="0" err="1"/>
+              <a:t>cont</a:t>
+            </a:r>
+            <a:r>
+              <a:rPr lang="en-AU" dirty="0"/>
+              <a:t>)</a:t>
+            </a:r>
+          </a:p>
+        </p:txBody>
+      </p:sp>
+      <p:sp>
+        <p:nvSpPr>
+          <p:cNvPr id="3" name="Content Placeholder 2"/>
+          <p:cNvSpPr>
+            <a:spLocks noGrp="1"/>
+          </p:cNvSpPr>
+          <p:nvPr>
+            <p:ph idx="1"/>
+          </p:nvPr>
+        </p:nvSpPr>
+        <p:spPr/>
+        <p:txBody>
+          <a:bodyPr/>
+          <a:lstStyle/>
+          <a:p>
+            <a:r>
+              <a:rPr lang="en-AU" dirty="0"/>
+              <a:t>Office Developer Show on MSAL</a:t>
+            </a:r>
+            <a:br>
+              <a:rPr lang="en-AU" dirty="0"/>
+            </a:br>
+            <a:r>
+              <a:rPr lang="en-AU" dirty="0">
+                <a:hlinkClick r:id="rId2"/>
+              </a:rPr>
+              <a:t>https://channel9.msdn.com/Shows/Office-Dev-Show/Office-Dev-Show-Episode-27-Azure-AD-Converged-Authentication-and-the-Microsoft-Graph</a:t>
+            </a:r>
+            <a:r>
+              <a:rPr lang="en-AU" dirty="0"/>
+              <a:t> </a:t>
+            </a:r>
+          </a:p>
+          <a:p>
+            <a:r>
+              <a:rPr lang="en-AU" sz="2800" kern="1200" dirty="0">
+                <a:solidFill>
+                  <a:schemeClr val="tx1"/>
+                </a:solidFill>
+                <a:effectLst/>
+                <a:latin typeface="+mn-lt"/>
+                <a:ea typeface="+mn-ea"/>
+                <a:cs typeface="+mn-cs"/>
+              </a:rPr>
+              <a:t>Office Developer Show on Excel REST API</a:t>
+            </a:r>
+            <a:br>
+              <a:rPr lang="en-AU" sz="2800" kern="1200" dirty="0">
+                <a:solidFill>
+                  <a:schemeClr val="tx1"/>
+                </a:solidFill>
+                <a:effectLst/>
+                <a:latin typeface="+mn-lt"/>
+                <a:ea typeface="+mn-ea"/>
+                <a:cs typeface="+mn-cs"/>
+              </a:rPr>
+            </a:br>
+            <a:r>
+              <a:rPr lang="en-AU" dirty="0">
+                <a:hlinkClick r:id="rId3"/>
+              </a:rPr>
+              <a:t>https://channel9.msdn.com/Shows/Office-Dev-Show/Office-Dev-Show-Episode-28-Microsoft-Graph-and-Excel-APIs</a:t>
+            </a:r>
+            <a:endParaRPr lang="en-AU" dirty="0"/>
+          </a:p>
+        </p:txBody>
+      </p:sp>
+    </p:spTree>
+    <p:extLst>
+      <p:ext uri="{BB962C8B-B14F-4D97-AF65-F5344CB8AC3E}">
+        <p14:creationId xmlns:p14="http://schemas.microsoft.com/office/powerpoint/2010/main" val="1079512826"/>
+      </p:ext>
+    </p:extLst>
+  </p:cSld>
+  <p:clrMapOvr>
+    <a:masterClrMapping/>
+  </p:clrMapOvr>
+</p:sld>
+</file>
+
+<file path=ppt/slides/slide22.xml><?xml version="1.0" encoding="utf-8"?>
+<p:sld xmlns:a="http://schemas.openxmlformats.org/drawingml/2006/main" xmlns:r="http://schemas.openxmlformats.org/officeDocument/2006/relationships" xmlns:p="http://schemas.openxmlformats.org/presentationml/2006/main">
+  <p:cSld>
+    <p:spTree>
+      <p:nvGrpSpPr>
+        <p:cNvPr id="1" name=""/>
+        <p:cNvGrpSpPr/>
+        <p:nvPr/>
+      </p:nvGrpSpPr>
+      <p:grpSpPr>
+        <a:xfrm>
+          <a:off x="0" y="0"/>
+          <a:ext cx="0" cy="0"/>
+          <a:chOff x="0" y="0"/>
+          <a:chExt cx="0" cy="0"/>
+        </a:xfrm>
+      </p:grpSpPr>
+      <p:sp>
+        <p:nvSpPr>
+          <p:cNvPr id="2" name="Title 1"/>
+          <p:cNvSpPr>
+            <a:spLocks noGrp="1"/>
+          </p:cNvSpPr>
+          <p:nvPr>
+            <p:ph type="title"/>
+          </p:nvPr>
+        </p:nvSpPr>
+        <p:spPr/>
+        <p:txBody>
+          <a:bodyPr/>
+          <a:lstStyle/>
+          <a:p>
+            <a:r>
+              <a:rPr lang="en-AU" dirty="0"/>
+              <a:t>Resources (Sample Code)</a:t>
+            </a:r>
+          </a:p>
+        </p:txBody>
+      </p:sp>
+      <p:sp>
+        <p:nvSpPr>
+          <p:cNvPr id="3" name="Content Placeholder 2"/>
+          <p:cNvSpPr>
+            <a:spLocks noGrp="1"/>
+          </p:cNvSpPr>
+          <p:nvPr>
+            <p:ph idx="1"/>
+          </p:nvPr>
+        </p:nvSpPr>
+        <p:spPr/>
+        <p:txBody>
+          <a:bodyPr/>
+          <a:lstStyle/>
+          <a:p>
+            <a:r>
+              <a:rPr lang="en-AU" dirty="0" err="1"/>
+              <a:t>Xamarin</a:t>
+            </a:r>
+            <a:r>
+              <a:rPr lang="en-AU" dirty="0"/>
+              <a:t> Blog on MSAL and Forms</a:t>
+            </a:r>
+            <a:br>
+              <a:rPr lang="en-AU" dirty="0"/>
+            </a:br>
+            <a:r>
+              <a:rPr lang="en-AU" dirty="0">
+                <a:hlinkClick r:id="rId2"/>
+              </a:rPr>
+              <a:t>https://blog.xamarin.com/authenticate-mobile-apps-using-microsoft-authentication-library/</a:t>
+            </a:r>
+            <a:endParaRPr lang="en-AU" dirty="0"/>
+          </a:p>
+          <a:p>
+            <a:r>
+              <a:rPr lang="en-AU" dirty="0">
+                <a:hlinkClick r:id="rId3"/>
+              </a:rPr>
+              <a:t>https://github.com/OfficeDev/Microsoft-Graph-ASPNET-REST-Excel-Donations</a:t>
+            </a:r>
+          </a:p>
+          <a:p>
+            <a:r>
+              <a:rPr lang="en-AU" dirty="0">
+                <a:hlinkClick r:id="rId4"/>
+              </a:rPr>
+              <a:t>https://github.com/microsoftgraph/xamarin-csharp-connect-sample</a:t>
+            </a:r>
+            <a:endParaRPr lang="en-AU" dirty="0"/>
+          </a:p>
+        </p:txBody>
+      </p:sp>
+    </p:spTree>
+    <p:extLst>
+      <p:ext uri="{BB962C8B-B14F-4D97-AF65-F5344CB8AC3E}">
+        <p14:creationId xmlns:p14="http://schemas.microsoft.com/office/powerpoint/2010/main" val="1992410197"/>
+      </p:ext>
+    </p:extLst>
+  </p:cSld>
+  <p:clrMapOvr>
+    <a:masterClrMapping/>
+  </p:clrMapOvr>
+</p:sld>
+</file>
+
+<file path=ppt/slides/slide23.xml><?xml version="1.0" encoding="utf-8"?>
+<p:sld xmlns:a="http://schemas.openxmlformats.org/drawingml/2006/main" xmlns:r="http://schemas.openxmlformats.org/officeDocument/2006/relationships" xmlns:p="http://schemas.openxmlformats.org/presentationml/2006/main">
+  <p:cSld>
+    <p:spTree>
+      <p:nvGrpSpPr>
+        <p:cNvPr id="1" name=""/>
+        <p:cNvGrpSpPr/>
+        <p:nvPr/>
+      </p:nvGrpSpPr>
+      <p:grpSpPr>
+        <a:xfrm>
+          <a:off x="0" y="0"/>
+          <a:ext cx="0" cy="0"/>
+          <a:chOff x="0" y="0"/>
+          <a:chExt cx="0" cy="0"/>
+        </a:xfrm>
+      </p:grpSpPr>
+      <p:sp>
+        <p:nvSpPr>
+          <p:cNvPr id="2" name="Title 1"/>
+          <p:cNvSpPr>
+            <a:spLocks noGrp="1"/>
+          </p:cNvSpPr>
+          <p:nvPr>
+            <p:ph type="title"/>
+          </p:nvPr>
+        </p:nvSpPr>
+        <p:spPr/>
+        <p:txBody>
+          <a:bodyPr/>
+          <a:lstStyle/>
+          <a:p>
+            <a:r>
+              <a:rPr lang="en-AU" dirty="0"/>
+              <a:t>Resources (//build/ videos)</a:t>
+            </a:r>
+          </a:p>
+        </p:txBody>
+      </p:sp>
+      <p:sp>
+        <p:nvSpPr>
+          <p:cNvPr id="3" name="Content Placeholder 2"/>
+          <p:cNvSpPr>
+            <a:spLocks noGrp="1"/>
+          </p:cNvSpPr>
+          <p:nvPr>
+            <p:ph idx="1"/>
+          </p:nvPr>
+        </p:nvSpPr>
+        <p:spPr/>
+        <p:txBody>
+          <a:bodyPr/>
+          <a:lstStyle/>
+          <a:p>
+            <a:r>
+              <a:rPr lang="en-AU" dirty="0"/>
+              <a:t>Microsoft Graph Overview</a:t>
+            </a:r>
+            <a:br>
+              <a:rPr lang="en-AU" dirty="0"/>
+            </a:br>
+            <a:r>
+              <a:rPr lang="en-AU" dirty="0">
+                <a:hlinkClick r:id="rId2"/>
+              </a:rPr>
+              <a:t>https://channel9.msdn.com/Events/Build/2016/P569</a:t>
+            </a:r>
+            <a:endParaRPr lang="en-AU" dirty="0"/>
+          </a:p>
+          <a:p>
+            <a:r>
+              <a:rPr lang="en-AU" dirty="0"/>
+              <a:t>Working with Excel Documents with the Microsoft Graph</a:t>
+            </a:r>
+            <a:br>
+              <a:rPr lang="en-AU" dirty="0"/>
+            </a:br>
+            <a:r>
+              <a:rPr lang="en-AU" dirty="0">
+                <a:hlinkClick r:id="rId3"/>
+              </a:rPr>
+              <a:t>https://channel9.msdn.com/Events/Build/2016/P556</a:t>
+            </a:r>
+            <a:endParaRPr lang="en-AU" dirty="0"/>
+          </a:p>
+          <a:p>
+            <a:r>
+              <a:rPr lang="en-AU" dirty="0"/>
+              <a:t>What's New with Microsoft Graph SDKs</a:t>
+            </a:r>
+            <a:br>
+              <a:rPr lang="en-AU" dirty="0"/>
+            </a:br>
+            <a:r>
+              <a:rPr lang="en-AU" dirty="0">
+                <a:hlinkClick r:id="rId4"/>
+              </a:rPr>
+              <a:t>https://channel9.msdn.com/Events/Build/2016/P563</a:t>
+            </a:r>
+            <a:endParaRPr lang="en-AU" dirty="0"/>
+          </a:p>
+          <a:p>
+            <a:r>
+              <a:rPr lang="en-AU" dirty="0"/>
+              <a:t>What's New in the People API on the Microsoft Graph</a:t>
+            </a:r>
+            <a:br>
+              <a:rPr lang="en-AU" dirty="0"/>
+            </a:br>
+            <a:r>
+              <a:rPr lang="en-AU" dirty="0">
+                <a:hlinkClick r:id="rId5"/>
+              </a:rPr>
+              <a:t>https://channel9.msdn.com/Events/Build/2016/P571</a:t>
+            </a:r>
+            <a:r>
+              <a:rPr lang="en-AU" dirty="0"/>
+              <a:t> </a:t>
+            </a:r>
+          </a:p>
+        </p:txBody>
+      </p:sp>
+    </p:spTree>
+    <p:extLst>
+      <p:ext uri="{BB962C8B-B14F-4D97-AF65-F5344CB8AC3E}">
+        <p14:creationId xmlns:p14="http://schemas.microsoft.com/office/powerpoint/2010/main" val="460096852"/>
+      </p:ext>
+    </p:extLst>
+  </p:cSld>
+  <p:clrMapOvr>
+    <a:masterClrMapping/>
+  </p:clrMapOvr>
+</p:sld>
+</file>
+
+<file path=ppt/slides/slide24.xml><?xml version="1.0" encoding="utf-8"?>
+<p:sld xmlns:a="http://schemas.openxmlformats.org/drawingml/2006/main" xmlns:r="http://schemas.openxmlformats.org/officeDocument/2006/relationships" xmlns:p="http://schemas.openxmlformats.org/presentationml/2006/main">
+  <p:cSld>
+    <p:spTree>
+      <p:nvGrpSpPr>
+        <p:cNvPr id="1" name=""/>
+        <p:cNvGrpSpPr/>
+        <p:nvPr/>
+      </p:nvGrpSpPr>
+      <p:grpSpPr>
+        <a:xfrm>
+          <a:off x="0" y="0"/>
+          <a:ext cx="0" cy="0"/>
+          <a:chOff x="0" y="0"/>
+          <a:chExt cx="0" cy="0"/>
+        </a:xfrm>
+      </p:grpSpPr>
+      <p:sp>
+        <p:nvSpPr>
+          <p:cNvPr id="2" name="Title 1"/>
+          <p:cNvSpPr>
+            <a:spLocks noGrp="1"/>
+          </p:cNvSpPr>
+          <p:nvPr>
+            <p:ph type="title"/>
+          </p:nvPr>
+        </p:nvSpPr>
+        <p:spPr/>
+        <p:txBody>
+          <a:bodyPr/>
+          <a:lstStyle/>
+          <a:p>
+            <a:r>
+              <a:rPr lang="en-AU" dirty="0"/>
               <a:t>Resources (Office Blog Posts)</a:t>
             </a:r>
           </a:p>
@@ -5886,7 +6686,7 @@
 </p:sld>
 </file>
 
-<file path=ppt/slides/slide22.xml><?xml version="1.0" encoding="utf-8"?>
+<file path=ppt/slides/slide25.xml><?xml version="1.0" encoding="utf-8"?>
 <p:sld xmlns:a="http://schemas.openxmlformats.org/drawingml/2006/main" xmlns:r="http://schemas.openxmlformats.org/officeDocument/2006/relationships" xmlns:p="http://schemas.openxmlformats.org/presentationml/2006/main">
   <p:cSld>
     <p:spTree>
@@ -6026,7 +6826,7 @@
 </p:sld>
 </file>
 
-<file path=ppt/slides/slide23.xml><?xml version="1.0" encoding="utf-8"?>
+<file path=ppt/slides/slide26.xml><?xml version="1.0" encoding="utf-8"?>
 <p:sld xmlns:a="http://schemas.openxmlformats.org/drawingml/2006/main" xmlns:r="http://schemas.openxmlformats.org/officeDocument/2006/relationships" xmlns:p="http://schemas.openxmlformats.org/presentationml/2006/main">
   <p:cSld>
     <p:spTree>

</xml_diff>